<commit_message>
Adicionando o restante do projeto
</commit_message>
<xml_diff>
--- a/5º Semestre/Engenharia de Software II/Trabalho/Apresentação - App Gerenciamento de Fila.pptx
+++ b/5º Semestre/Engenharia de Software II/Trabalho/Apresentação - App Gerenciamento de Fila.pptx
@@ -135,1430 +135,6 @@
     <p1510:client id="{4D041D26-129F-4DA4-AB9B-E21DC7DBE14F}" v="942" dt="2019-11-21T10:32:58.586"/>
   </p1510:revLst>
 </p1510:revInfo>
-</file>
-
-<file path=ppt/changesInfos/changesInfo1.xml><?xml version="1.0" encoding="utf-8"?>
-<pc:chgInfo xmlns:a="http://schemas.openxmlformats.org/drawingml/2006/main" xmlns:r="http://schemas.openxmlformats.org/officeDocument/2006/relationships" xmlns:ac="http://schemas.microsoft.com/office/drawing/2013/main/command" xmlns:pc="http://schemas.microsoft.com/office/powerpoint/2013/main/command">
-  <pc:docChgLst>
-    <pc:chgData name="Rithie Natan" userId="515ab963006320ae" providerId="Windows Live" clId="Web-{3DBCC47B-38D4-4E79-B20C-509D5CC8EC64}"/>
-    <pc:docChg chg="addSld delSld modSld">
-      <pc:chgData name="Rithie Natan" userId="515ab963006320ae" providerId="Windows Live" clId="Web-{3DBCC47B-38D4-4E79-B20C-509D5CC8EC64}" dt="2019-11-21T10:54:30.923" v="131" actId="1076"/>
-      <pc:docMkLst>
-        <pc:docMk/>
-      </pc:docMkLst>
-      <pc:sldChg chg="addSp delSp modSp new mod setBg">
-        <pc:chgData name="Rithie Natan" userId="515ab963006320ae" providerId="Windows Live" clId="Web-{3DBCC47B-38D4-4E79-B20C-509D5CC8EC64}" dt="2019-11-21T10:53:02.361" v="91" actId="20577"/>
-        <pc:sldMkLst>
-          <pc:docMk/>
-          <pc:sldMk cId="979530892" sldId="270"/>
-        </pc:sldMkLst>
-        <pc:spChg chg="mod">
-          <ac:chgData name="Rithie Natan" userId="515ab963006320ae" providerId="Windows Live" clId="Web-{3DBCC47B-38D4-4E79-B20C-509D5CC8EC64}" dt="2019-11-21T10:52:33.549" v="60"/>
-          <ac:spMkLst>
-            <pc:docMk/>
-            <pc:sldMk cId="979530892" sldId="270"/>
-            <ac:spMk id="2" creationId="{53C7FC21-5069-4D1A-BB9A-1CA0A276975F}"/>
-          </ac:spMkLst>
-        </pc:spChg>
-        <pc:spChg chg="mod">
-          <ac:chgData name="Rithie Natan" userId="515ab963006320ae" providerId="Windows Live" clId="Web-{3DBCC47B-38D4-4E79-B20C-509D5CC8EC64}" dt="2019-11-21T10:53:02.361" v="91" actId="20577"/>
-          <ac:spMkLst>
-            <pc:docMk/>
-            <pc:sldMk cId="979530892" sldId="270"/>
-            <ac:spMk id="3" creationId="{E953CEF7-48F1-4C2B-8F4A-B01DD419A080}"/>
-          </ac:spMkLst>
-        </pc:spChg>
-        <pc:spChg chg="add">
-          <ac:chgData name="Rithie Natan" userId="515ab963006320ae" providerId="Windows Live" clId="Web-{3DBCC47B-38D4-4E79-B20C-509D5CC8EC64}" dt="2019-11-21T10:52:33.549" v="60"/>
-          <ac:spMkLst>
-            <pc:docMk/>
-            <pc:sldMk cId="979530892" sldId="270"/>
-            <ac:spMk id="6" creationId="{DD651B61-325E-4E73-8445-38B0DE8AAAB6}"/>
-          </ac:spMkLst>
-        </pc:spChg>
-        <pc:spChg chg="add">
-          <ac:chgData name="Rithie Natan" userId="515ab963006320ae" providerId="Windows Live" clId="Web-{3DBCC47B-38D4-4E79-B20C-509D5CC8EC64}" dt="2019-11-21T10:52:33.549" v="60"/>
-          <ac:spMkLst>
-            <pc:docMk/>
-            <pc:sldMk cId="979530892" sldId="270"/>
-            <ac:spMk id="7" creationId="{B42E5253-D3AC-4AC2-B766-8B34F13C2F5E}"/>
-          </ac:spMkLst>
-        </pc:spChg>
-        <pc:spChg chg="add">
-          <ac:chgData name="Rithie Natan" userId="515ab963006320ae" providerId="Windows Live" clId="Web-{3DBCC47B-38D4-4E79-B20C-509D5CC8EC64}" dt="2019-11-21T10:52:33.549" v="60"/>
-          <ac:spMkLst>
-            <pc:docMk/>
-            <pc:sldMk cId="979530892" sldId="270"/>
-            <ac:spMk id="8" creationId="{10AE8D57-436A-4073-9A75-15BB5949F8B4}"/>
-          </ac:spMkLst>
-        </pc:spChg>
-        <pc:spChg chg="add del">
-          <ac:chgData name="Rithie Natan" userId="515ab963006320ae" providerId="Windows Live" clId="Web-{3DBCC47B-38D4-4E79-B20C-509D5CC8EC64}" dt="2019-11-21T10:52:33.533" v="59"/>
-          <ac:spMkLst>
-            <pc:docMk/>
-            <pc:sldMk cId="979530892" sldId="270"/>
-            <ac:spMk id="9" creationId="{DD651B61-325E-4E73-8445-38B0DE8AAAB6}"/>
-          </ac:spMkLst>
-        </pc:spChg>
-        <pc:spChg chg="add">
-          <ac:chgData name="Rithie Natan" userId="515ab963006320ae" providerId="Windows Live" clId="Web-{3DBCC47B-38D4-4E79-B20C-509D5CC8EC64}" dt="2019-11-21T10:52:33.549" v="60"/>
-          <ac:spMkLst>
-            <pc:docMk/>
-            <pc:sldMk cId="979530892" sldId="270"/>
-            <ac:spMk id="10" creationId="{E2852671-8EB6-4EAF-8AF8-65CF3FD66456}"/>
-          </ac:spMkLst>
-        </pc:spChg>
-        <pc:spChg chg="add del">
-          <ac:chgData name="Rithie Natan" userId="515ab963006320ae" providerId="Windows Live" clId="Web-{3DBCC47B-38D4-4E79-B20C-509D5CC8EC64}" dt="2019-11-21T10:52:33.533" v="59"/>
-          <ac:spMkLst>
-            <pc:docMk/>
-            <pc:sldMk cId="979530892" sldId="270"/>
-            <ac:spMk id="11" creationId="{B42E5253-D3AC-4AC2-B766-8B34F13C2F5E}"/>
-          </ac:spMkLst>
-        </pc:spChg>
-        <pc:spChg chg="add">
-          <ac:chgData name="Rithie Natan" userId="515ab963006320ae" providerId="Windows Live" clId="Web-{3DBCC47B-38D4-4E79-B20C-509D5CC8EC64}" dt="2019-11-21T10:52:33.549" v="60"/>
-          <ac:spMkLst>
-            <pc:docMk/>
-            <pc:sldMk cId="979530892" sldId="270"/>
-            <ac:spMk id="12" creationId="{26B4480E-B7FF-4481-890E-043A69AE6FE2}"/>
-          </ac:spMkLst>
-        </pc:spChg>
-        <pc:spChg chg="add del">
-          <ac:chgData name="Rithie Natan" userId="515ab963006320ae" providerId="Windows Live" clId="Web-{3DBCC47B-38D4-4E79-B20C-509D5CC8EC64}" dt="2019-11-21T10:52:33.533" v="59"/>
-          <ac:spMkLst>
-            <pc:docMk/>
-            <pc:sldMk cId="979530892" sldId="270"/>
-            <ac:spMk id="13" creationId="{10AE8D57-436A-4073-9A75-15BB5949F8B4}"/>
-          </ac:spMkLst>
-        </pc:spChg>
-        <pc:spChg chg="add">
-          <ac:chgData name="Rithie Natan" userId="515ab963006320ae" providerId="Windows Live" clId="Web-{3DBCC47B-38D4-4E79-B20C-509D5CC8EC64}" dt="2019-11-21T10:52:33.549" v="60"/>
-          <ac:spMkLst>
-            <pc:docMk/>
-            <pc:sldMk cId="979530892" sldId="270"/>
-            <ac:spMk id="14" creationId="{8C2840C6-6494-4E12-A428-2012DA7DDF8A}"/>
-          </ac:spMkLst>
-        </pc:spChg>
-        <pc:spChg chg="add del">
-          <ac:chgData name="Rithie Natan" userId="515ab963006320ae" providerId="Windows Live" clId="Web-{3DBCC47B-38D4-4E79-B20C-509D5CC8EC64}" dt="2019-11-21T10:52:33.533" v="59"/>
-          <ac:spMkLst>
-            <pc:docMk/>
-            <pc:sldMk cId="979530892" sldId="270"/>
-            <ac:spMk id="15" creationId="{E2852671-8EB6-4EAF-8AF8-65CF3FD66456}"/>
-          </ac:spMkLst>
-        </pc:spChg>
-        <pc:spChg chg="add del">
-          <ac:chgData name="Rithie Natan" userId="515ab963006320ae" providerId="Windows Live" clId="Web-{3DBCC47B-38D4-4E79-B20C-509D5CC8EC64}" dt="2019-11-21T10:52:33.533" v="59"/>
-          <ac:spMkLst>
-            <pc:docMk/>
-            <pc:sldMk cId="979530892" sldId="270"/>
-            <ac:spMk id="17" creationId="{26B4480E-B7FF-4481-890E-043A69AE6FE2}"/>
-          </ac:spMkLst>
-        </pc:spChg>
-        <pc:spChg chg="add">
-          <ac:chgData name="Rithie Natan" userId="515ab963006320ae" providerId="Windows Live" clId="Web-{3DBCC47B-38D4-4E79-B20C-509D5CC8EC64}" dt="2019-11-21T10:52:33.549" v="60"/>
-          <ac:spMkLst>
-            <pc:docMk/>
-            <pc:sldMk cId="979530892" sldId="270"/>
-            <ac:spMk id="21" creationId="{8CF5084D-B617-4011-8406-A93B64723187}"/>
-          </ac:spMkLst>
-        </pc:spChg>
-        <pc:grpChg chg="add del">
-          <ac:chgData name="Rithie Natan" userId="515ab963006320ae" providerId="Windows Live" clId="Web-{3DBCC47B-38D4-4E79-B20C-509D5CC8EC64}" dt="2019-11-21T10:52:33.533" v="59"/>
-          <ac:grpSpMkLst>
-            <pc:docMk/>
-            <pc:sldMk cId="979530892" sldId="270"/>
-            <ac:grpSpMk id="19" creationId="{79394E1F-0B5F-497D-B2A6-8383A2A54834}"/>
-          </ac:grpSpMkLst>
-        </pc:grpChg>
-        <pc:picChg chg="add mod">
-          <ac:chgData name="Rithie Natan" userId="515ab963006320ae" providerId="Windows Live" clId="Web-{3DBCC47B-38D4-4E79-B20C-509D5CC8EC64}" dt="2019-11-21T10:52:33.549" v="60"/>
-          <ac:picMkLst>
-            <pc:docMk/>
-            <pc:sldMk cId="979530892" sldId="270"/>
-            <ac:picMk id="4" creationId="{BA10013D-E0C6-45CD-A04B-5A3473AB9B3D}"/>
-          </ac:picMkLst>
-        </pc:picChg>
-      </pc:sldChg>
-      <pc:sldChg chg="add del replId">
-        <pc:chgData name="Rithie Natan" userId="515ab963006320ae" providerId="Windows Live" clId="Web-{3DBCC47B-38D4-4E79-B20C-509D5CC8EC64}" dt="2019-11-21T10:51:33.815" v="1"/>
-        <pc:sldMkLst>
-          <pc:docMk/>
-          <pc:sldMk cId="1434350067" sldId="270"/>
-        </pc:sldMkLst>
-      </pc:sldChg>
-      <pc:sldChg chg="addSp delSp modSp add replId">
-        <pc:chgData name="Rithie Natan" userId="515ab963006320ae" providerId="Windows Live" clId="Web-{3DBCC47B-38D4-4E79-B20C-509D5CC8EC64}" dt="2019-11-21T10:54:00.954" v="116" actId="20577"/>
-        <pc:sldMkLst>
-          <pc:docMk/>
-          <pc:sldMk cId="1584018476" sldId="271"/>
-        </pc:sldMkLst>
-        <pc:spChg chg="mod">
-          <ac:chgData name="Rithie Natan" userId="515ab963006320ae" providerId="Windows Live" clId="Web-{3DBCC47B-38D4-4E79-B20C-509D5CC8EC64}" dt="2019-11-21T10:54:00.954" v="116" actId="20577"/>
-          <ac:spMkLst>
-            <pc:docMk/>
-            <pc:sldMk cId="1584018476" sldId="271"/>
-            <ac:spMk id="3" creationId="{E953CEF7-48F1-4C2B-8F4A-B01DD419A080}"/>
-          </ac:spMkLst>
-        </pc:spChg>
-        <pc:picChg chg="del">
-          <ac:chgData name="Rithie Natan" userId="515ab963006320ae" providerId="Windows Live" clId="Web-{3DBCC47B-38D4-4E79-B20C-509D5CC8EC64}" dt="2019-11-21T10:53:13.376" v="95"/>
-          <ac:picMkLst>
-            <pc:docMk/>
-            <pc:sldMk cId="1584018476" sldId="271"/>
-            <ac:picMk id="4" creationId="{BA10013D-E0C6-45CD-A04B-5A3473AB9B3D}"/>
-          </ac:picMkLst>
-        </pc:picChg>
-        <pc:picChg chg="add mod">
-          <ac:chgData name="Rithie Natan" userId="515ab963006320ae" providerId="Windows Live" clId="Web-{3DBCC47B-38D4-4E79-B20C-509D5CC8EC64}" dt="2019-11-21T10:53:46.579" v="101" actId="1076"/>
-          <ac:picMkLst>
-            <pc:docMk/>
-            <pc:sldMk cId="1584018476" sldId="271"/>
-            <ac:picMk id="5" creationId="{E17ABD66-D7AD-419B-81C7-D0DCACE9B3C4}"/>
-          </ac:picMkLst>
-        </pc:picChg>
-      </pc:sldChg>
-      <pc:sldChg chg="addSp delSp modSp add replId">
-        <pc:chgData name="Rithie Natan" userId="515ab963006320ae" providerId="Windows Live" clId="Web-{3DBCC47B-38D4-4E79-B20C-509D5CC8EC64}" dt="2019-11-21T10:54:30.923" v="131" actId="1076"/>
-        <pc:sldMkLst>
-          <pc:docMk/>
-          <pc:sldMk cId="2073760431" sldId="272"/>
-        </pc:sldMkLst>
-        <pc:spChg chg="mod">
-          <ac:chgData name="Rithie Natan" userId="515ab963006320ae" providerId="Windows Live" clId="Web-{3DBCC47B-38D4-4E79-B20C-509D5CC8EC64}" dt="2019-11-21T10:54:13.329" v="125" actId="20577"/>
-          <ac:spMkLst>
-            <pc:docMk/>
-            <pc:sldMk cId="2073760431" sldId="272"/>
-            <ac:spMk id="3" creationId="{E953CEF7-48F1-4C2B-8F4A-B01DD419A080}"/>
-          </ac:spMkLst>
-        </pc:spChg>
-        <pc:picChg chg="add mod">
-          <ac:chgData name="Rithie Natan" userId="515ab963006320ae" providerId="Windows Live" clId="Web-{3DBCC47B-38D4-4E79-B20C-509D5CC8EC64}" dt="2019-11-21T10:54:30.923" v="131" actId="1076"/>
-          <ac:picMkLst>
-            <pc:docMk/>
-            <pc:sldMk cId="2073760431" sldId="272"/>
-            <ac:picMk id="4" creationId="{91EF03B9-E441-4A0A-B8B0-E0D1C774BE45}"/>
-          </ac:picMkLst>
-        </pc:picChg>
-        <pc:picChg chg="del">
-          <ac:chgData name="Rithie Natan" userId="515ab963006320ae" providerId="Windows Live" clId="Web-{3DBCC47B-38D4-4E79-B20C-509D5CC8EC64}" dt="2019-11-21T10:54:15.110" v="127"/>
-          <ac:picMkLst>
-            <pc:docMk/>
-            <pc:sldMk cId="2073760431" sldId="272"/>
-            <ac:picMk id="5" creationId="{E17ABD66-D7AD-419B-81C7-D0DCACE9B3C4}"/>
-          </ac:picMkLst>
-        </pc:picChg>
-      </pc:sldChg>
-    </pc:docChg>
-  </pc:docChgLst>
-  <pc:docChgLst>
-    <pc:chgData name="Rithie Natan" userId="515ab963006320ae" providerId="Windows Live" clId="Web-{4D041D26-129F-4DA4-AB9B-E21DC7DBE14F}"/>
-    <pc:docChg chg="addSld delSld modSld addMainMaster delMainMaster">
-      <pc:chgData name="Rithie Natan" userId="515ab963006320ae" providerId="Windows Live" clId="Web-{4D041D26-129F-4DA4-AB9B-E21DC7DBE14F}" dt="2019-11-21T10:32:58.492" v="901" actId="20577"/>
-      <pc:docMkLst>
-        <pc:docMk/>
-      </pc:docMkLst>
-      <pc:sldChg chg="addSp modSp mod setBg modClrScheme chgLayout">
-        <pc:chgData name="Rithie Natan" userId="515ab963006320ae" providerId="Windows Live" clId="Web-{4D041D26-129F-4DA4-AB9B-E21DC7DBE14F}" dt="2019-11-21T09:48:50.317" v="62" actId="20577"/>
-        <pc:sldMkLst>
-          <pc:docMk/>
-          <pc:sldMk cId="2210866551" sldId="256"/>
-        </pc:sldMkLst>
-        <pc:spChg chg="mod">
-          <ac:chgData name="Rithie Natan" userId="515ab963006320ae" providerId="Windows Live" clId="Web-{4D041D26-129F-4DA4-AB9B-E21DC7DBE14F}" dt="2019-11-21T09:48:46.708" v="51" actId="20577"/>
-          <ac:spMkLst>
-            <pc:docMk/>
-            <pc:sldMk cId="2210866551" sldId="256"/>
-            <ac:spMk id="2" creationId="{00000000-0000-0000-0000-000000000000}"/>
-          </ac:spMkLst>
-        </pc:spChg>
-        <pc:spChg chg="mod">
-          <ac:chgData name="Rithie Natan" userId="515ab963006320ae" providerId="Windows Live" clId="Web-{4D041D26-129F-4DA4-AB9B-E21DC7DBE14F}" dt="2019-11-21T09:48:50.317" v="62" actId="20577"/>
-          <ac:spMkLst>
-            <pc:docMk/>
-            <pc:sldMk cId="2210866551" sldId="256"/>
-            <ac:spMk id="3" creationId="{00000000-0000-0000-0000-000000000000}"/>
-          </ac:spMkLst>
-        </pc:spChg>
-        <pc:spChg chg="add">
-          <ac:chgData name="Rithie Natan" userId="515ab963006320ae" providerId="Windows Live" clId="Web-{4D041D26-129F-4DA4-AB9B-E21DC7DBE14F}" dt="2019-11-21T09:47:53.287" v="0"/>
-          <ac:spMkLst>
-            <pc:docMk/>
-            <pc:sldMk cId="2210866551" sldId="256"/>
-            <ac:spMk id="8" creationId="{AF47317F-C87A-4D9C-A72E-89C67FDA2CA6}"/>
-          </ac:spMkLst>
-        </pc:spChg>
-        <pc:spChg chg="add">
-          <ac:chgData name="Rithie Natan" userId="515ab963006320ae" providerId="Windows Live" clId="Web-{4D041D26-129F-4DA4-AB9B-E21DC7DBE14F}" dt="2019-11-21T09:47:53.287" v="0"/>
-          <ac:spMkLst>
-            <pc:docMk/>
-            <pc:sldMk cId="2210866551" sldId="256"/>
-            <ac:spMk id="10" creationId="{EA343C5F-7AA1-409B-BD18-44E928CE30BB}"/>
-          </ac:spMkLst>
-        </pc:spChg>
-        <pc:spChg chg="add">
-          <ac:chgData name="Rithie Natan" userId="515ab963006320ae" providerId="Windows Live" clId="Web-{4D041D26-129F-4DA4-AB9B-E21DC7DBE14F}" dt="2019-11-21T09:47:53.287" v="0"/>
-          <ac:spMkLst>
-            <pc:docMk/>
-            <pc:sldMk cId="2210866551" sldId="256"/>
-            <ac:spMk id="12" creationId="{93FF31F9-8C96-4D43-9B36-20F6B6FE6677}"/>
-          </ac:spMkLst>
-        </pc:spChg>
-        <pc:spChg chg="add">
-          <ac:chgData name="Rithie Natan" userId="515ab963006320ae" providerId="Windows Live" clId="Web-{4D041D26-129F-4DA4-AB9B-E21DC7DBE14F}" dt="2019-11-21T09:47:53.287" v="0"/>
-          <ac:spMkLst>
-            <pc:docMk/>
-            <pc:sldMk cId="2210866551" sldId="256"/>
-            <ac:spMk id="14" creationId="{3D252CC1-04C4-47A3-AFEA-5022A689C848}"/>
-          </ac:spMkLst>
-        </pc:spChg>
-      </pc:sldChg>
-      <pc:sldChg chg="addSp modSp new mod setBg setClrOvrMap">
-        <pc:chgData name="Rithie Natan" userId="515ab963006320ae" providerId="Windows Live" clId="Web-{4D041D26-129F-4DA4-AB9B-E21DC7DBE14F}" dt="2019-11-21T09:51:57.523" v="144"/>
-        <pc:sldMkLst>
-          <pc:docMk/>
-          <pc:sldMk cId="1896743541" sldId="257"/>
-        </pc:sldMkLst>
-        <pc:spChg chg="mod">
-          <ac:chgData name="Rithie Natan" userId="515ab963006320ae" providerId="Windows Live" clId="Web-{4D041D26-129F-4DA4-AB9B-E21DC7DBE14F}" dt="2019-11-21T09:51:57.523" v="144"/>
-          <ac:spMkLst>
-            <pc:docMk/>
-            <pc:sldMk cId="1896743541" sldId="257"/>
-            <ac:spMk id="2" creationId="{674855D9-0F20-43F5-B6CC-BC69C9D968D7}"/>
-          </ac:spMkLst>
-        </pc:spChg>
-        <pc:spChg chg="mod">
-          <ac:chgData name="Rithie Natan" userId="515ab963006320ae" providerId="Windows Live" clId="Web-{4D041D26-129F-4DA4-AB9B-E21DC7DBE14F}" dt="2019-11-21T09:51:57.523" v="144"/>
-          <ac:spMkLst>
-            <pc:docMk/>
-            <pc:sldMk cId="1896743541" sldId="257"/>
-            <ac:spMk id="3" creationId="{7AA5D0BD-91E9-46D0-A87A-D368270096C6}"/>
-          </ac:spMkLst>
-        </pc:spChg>
-        <pc:spChg chg="add">
-          <ac:chgData name="Rithie Natan" userId="515ab963006320ae" providerId="Windows Live" clId="Web-{4D041D26-129F-4DA4-AB9B-E21DC7DBE14F}" dt="2019-11-21T09:51:57.523" v="144"/>
-          <ac:spMkLst>
-            <pc:docMk/>
-            <pc:sldMk cId="1896743541" sldId="257"/>
-            <ac:spMk id="9" creationId="{E6C8E6EB-4C59-429B-97E4-72A058CFC4FB}"/>
-          </ac:spMkLst>
-        </pc:spChg>
-        <pc:spChg chg="add">
-          <ac:chgData name="Rithie Natan" userId="515ab963006320ae" providerId="Windows Live" clId="Web-{4D041D26-129F-4DA4-AB9B-E21DC7DBE14F}" dt="2019-11-21T09:51:57.523" v="144"/>
-          <ac:spMkLst>
-            <pc:docMk/>
-            <pc:sldMk cId="1896743541" sldId="257"/>
-            <ac:spMk id="11" creationId="{B5B90362-AFCC-46A9-B41C-A257A8C5B314}"/>
-          </ac:spMkLst>
-        </pc:spChg>
-        <pc:spChg chg="add">
-          <ac:chgData name="Rithie Natan" userId="515ab963006320ae" providerId="Windows Live" clId="Web-{4D041D26-129F-4DA4-AB9B-E21DC7DBE14F}" dt="2019-11-21T09:51:57.523" v="144"/>
-          <ac:spMkLst>
-            <pc:docMk/>
-            <pc:sldMk cId="1896743541" sldId="257"/>
-            <ac:spMk id="13" creationId="{F71EF7F1-38BA-471D-8CD4-2A9AE8E35527}"/>
-          </ac:spMkLst>
-        </pc:spChg>
-        <pc:spChg chg="add">
-          <ac:chgData name="Rithie Natan" userId="515ab963006320ae" providerId="Windows Live" clId="Web-{4D041D26-129F-4DA4-AB9B-E21DC7DBE14F}" dt="2019-11-21T09:51:57.523" v="144"/>
-          <ac:spMkLst>
-            <pc:docMk/>
-            <pc:sldMk cId="1896743541" sldId="257"/>
-            <ac:spMk id="15" creationId="{C0524398-BFB4-4C4A-8317-83B8729F9B26}"/>
-          </ac:spMkLst>
-        </pc:spChg>
-        <pc:spChg chg="add">
-          <ac:chgData name="Rithie Natan" userId="515ab963006320ae" providerId="Windows Live" clId="Web-{4D041D26-129F-4DA4-AB9B-E21DC7DBE14F}" dt="2019-11-21T09:51:57.523" v="144"/>
-          <ac:spMkLst>
-            <pc:docMk/>
-            <pc:sldMk cId="1896743541" sldId="257"/>
-            <ac:spMk id="17" creationId="{E08D4B6A-8113-4DFB-B82E-B60CAC8E0A50}"/>
-          </ac:spMkLst>
-        </pc:spChg>
-        <pc:spChg chg="add">
-          <ac:chgData name="Rithie Natan" userId="515ab963006320ae" providerId="Windows Live" clId="Web-{4D041D26-129F-4DA4-AB9B-E21DC7DBE14F}" dt="2019-11-21T09:51:57.523" v="144"/>
-          <ac:spMkLst>
-            <pc:docMk/>
-            <pc:sldMk cId="1896743541" sldId="257"/>
-            <ac:spMk id="19" creationId="{9822E561-F97C-4CBB-A9A6-A6BF6317BC84}"/>
-          </ac:spMkLst>
-        </pc:spChg>
-        <pc:spChg chg="add">
-          <ac:chgData name="Rithie Natan" userId="515ab963006320ae" providerId="Windows Live" clId="Web-{4D041D26-129F-4DA4-AB9B-E21DC7DBE14F}" dt="2019-11-21T09:51:57.523" v="144"/>
-          <ac:spMkLst>
-            <pc:docMk/>
-            <pc:sldMk cId="1896743541" sldId="257"/>
-            <ac:spMk id="21" creationId="{B01B0E58-A5C8-4CDA-A2E0-35DF94E59857}"/>
-          </ac:spMkLst>
-        </pc:spChg>
-        <pc:picChg chg="add mod">
-          <ac:chgData name="Rithie Natan" userId="515ab963006320ae" providerId="Windows Live" clId="Web-{4D041D26-129F-4DA4-AB9B-E21DC7DBE14F}" dt="2019-11-21T09:51:57.523" v="144"/>
-          <ac:picMkLst>
-            <pc:docMk/>
-            <pc:sldMk cId="1896743541" sldId="257"/>
-            <ac:picMk id="4" creationId="{998C676E-438F-455E-80C2-735902AF7CFA}"/>
-          </ac:picMkLst>
-        </pc:picChg>
-      </pc:sldChg>
-      <pc:sldChg chg="addSp delSp modSp new mod setBg setClrOvrMap">
-        <pc:chgData name="Rithie Natan" userId="515ab963006320ae" providerId="Windows Live" clId="Web-{4D041D26-129F-4DA4-AB9B-E21DC7DBE14F}" dt="2019-11-21T09:58:35.586" v="208" actId="20577"/>
-        <pc:sldMkLst>
-          <pc:docMk/>
-          <pc:sldMk cId="1218809312" sldId="258"/>
-        </pc:sldMkLst>
-        <pc:spChg chg="mod">
-          <ac:chgData name="Rithie Natan" userId="515ab963006320ae" providerId="Windows Live" clId="Web-{4D041D26-129F-4DA4-AB9B-E21DC7DBE14F}" dt="2019-11-21T09:58:35.586" v="208" actId="20577"/>
-          <ac:spMkLst>
-            <pc:docMk/>
-            <pc:sldMk cId="1218809312" sldId="258"/>
-            <ac:spMk id="2" creationId="{67682A72-DA42-428F-83E0-3B250F5782BE}"/>
-          </ac:spMkLst>
-        </pc:spChg>
-        <pc:spChg chg="del">
-          <ac:chgData name="Rithie Natan" userId="515ab963006320ae" providerId="Windows Live" clId="Web-{4D041D26-129F-4DA4-AB9B-E21DC7DBE14F}" dt="2019-11-21T09:57:26.632" v="185"/>
-          <ac:spMkLst>
-            <pc:docMk/>
-            <pc:sldMk cId="1218809312" sldId="258"/>
-            <ac:spMk id="3" creationId="{B378669A-33E6-4504-A50B-C22481A826C3}"/>
-          </ac:spMkLst>
-        </pc:spChg>
-        <pc:spChg chg="add">
-          <ac:chgData name="Rithie Natan" userId="515ab963006320ae" providerId="Windows Live" clId="Web-{4D041D26-129F-4DA4-AB9B-E21DC7DBE14F}" dt="2019-11-21T09:58:20.803" v="196"/>
-          <ac:spMkLst>
-            <pc:docMk/>
-            <pc:sldMk cId="1218809312" sldId="258"/>
-            <ac:spMk id="6" creationId="{E9751CB9-7B25-4EB8-9A6F-82F822549F12}"/>
-          </ac:spMkLst>
-        </pc:spChg>
-        <pc:spChg chg="add">
-          <ac:chgData name="Rithie Natan" userId="515ab963006320ae" providerId="Windows Live" clId="Web-{4D041D26-129F-4DA4-AB9B-E21DC7DBE14F}" dt="2019-11-21T09:58:20.803" v="196"/>
-          <ac:spMkLst>
-            <pc:docMk/>
-            <pc:sldMk cId="1218809312" sldId="258"/>
-            <ac:spMk id="7" creationId="{E1317383-CF3B-4B02-9512-BECBEF6362A4}"/>
-          </ac:spMkLst>
-        </pc:spChg>
-        <pc:spChg chg="add mod">
-          <ac:chgData name="Rithie Natan" userId="515ab963006320ae" providerId="Windows Live" clId="Web-{4D041D26-129F-4DA4-AB9B-E21DC7DBE14F}" dt="2019-11-21T09:58:31.787" v="202" actId="20577"/>
-          <ac:spMkLst>
-            <pc:docMk/>
-            <pc:sldMk cId="1218809312" sldId="258"/>
-            <ac:spMk id="8" creationId="{25A162BF-EE54-4513-8D7B-028D898525F3}"/>
-          </ac:spMkLst>
-        </pc:spChg>
-        <pc:spChg chg="add del">
-          <ac:chgData name="Rithie Natan" userId="515ab963006320ae" providerId="Windows Live" clId="Web-{4D041D26-129F-4DA4-AB9B-E21DC7DBE14F}" dt="2019-11-21T09:58:00.913" v="193"/>
-          <ac:spMkLst>
-            <pc:docMk/>
-            <pc:sldMk cId="1218809312" sldId="258"/>
-            <ac:spMk id="9" creationId="{E6C8E6EB-4C59-429B-97E4-72A058CFC4FB}"/>
-          </ac:spMkLst>
-        </pc:spChg>
-        <pc:spChg chg="add">
-          <ac:chgData name="Rithie Natan" userId="515ab963006320ae" providerId="Windows Live" clId="Web-{4D041D26-129F-4DA4-AB9B-E21DC7DBE14F}" dt="2019-11-21T09:58:20.803" v="196"/>
-          <ac:spMkLst>
-            <pc:docMk/>
-            <pc:sldMk cId="1218809312" sldId="258"/>
-            <ac:spMk id="10" creationId="{B1D4C7A0-6DF2-4F2D-A45D-F111582974C7}"/>
-          </ac:spMkLst>
-        </pc:spChg>
-        <pc:spChg chg="add del">
-          <ac:chgData name="Rithie Natan" userId="515ab963006320ae" providerId="Windows Live" clId="Web-{4D041D26-129F-4DA4-AB9B-E21DC7DBE14F}" dt="2019-11-21T09:58:00.913" v="193"/>
-          <ac:spMkLst>
-            <pc:docMk/>
-            <pc:sldMk cId="1218809312" sldId="258"/>
-            <ac:spMk id="11" creationId="{B5B90362-AFCC-46A9-B41C-A257A8C5B314}"/>
-          </ac:spMkLst>
-        </pc:spChg>
-        <pc:spChg chg="add">
-          <ac:chgData name="Rithie Natan" userId="515ab963006320ae" providerId="Windows Live" clId="Web-{4D041D26-129F-4DA4-AB9B-E21DC7DBE14F}" dt="2019-11-21T09:58:20.803" v="196"/>
-          <ac:spMkLst>
-            <pc:docMk/>
-            <pc:sldMk cId="1218809312" sldId="258"/>
-            <ac:spMk id="12" creationId="{DBF3943D-BCB6-4B31-809D-A005686483B4}"/>
-          </ac:spMkLst>
-        </pc:spChg>
-        <pc:spChg chg="add del">
-          <ac:chgData name="Rithie Natan" userId="515ab963006320ae" providerId="Windows Live" clId="Web-{4D041D26-129F-4DA4-AB9B-E21DC7DBE14F}" dt="2019-11-21T09:58:00.913" v="193"/>
-          <ac:spMkLst>
-            <pc:docMk/>
-            <pc:sldMk cId="1218809312" sldId="258"/>
-            <ac:spMk id="13" creationId="{F71EF7F1-38BA-471D-8CD4-2A9AE8E35527}"/>
-          </ac:spMkLst>
-        </pc:spChg>
-        <pc:spChg chg="add">
-          <ac:chgData name="Rithie Natan" userId="515ab963006320ae" providerId="Windows Live" clId="Web-{4D041D26-129F-4DA4-AB9B-E21DC7DBE14F}" dt="2019-11-21T09:58:20.803" v="196"/>
-          <ac:spMkLst>
-            <pc:docMk/>
-            <pc:sldMk cId="1218809312" sldId="258"/>
-            <ac:spMk id="14" creationId="{39373A6F-2E1F-4613-8E1D-D68057D29F31}"/>
-          </ac:spMkLst>
-        </pc:spChg>
-        <pc:spChg chg="add del">
-          <ac:chgData name="Rithie Natan" userId="515ab963006320ae" providerId="Windows Live" clId="Web-{4D041D26-129F-4DA4-AB9B-E21DC7DBE14F}" dt="2019-11-21T09:58:00.913" v="193"/>
-          <ac:spMkLst>
-            <pc:docMk/>
-            <pc:sldMk cId="1218809312" sldId="258"/>
-            <ac:spMk id="15" creationId="{C0524398-BFB4-4C4A-8317-83B8729F9B26}"/>
-          </ac:spMkLst>
-        </pc:spChg>
-        <pc:spChg chg="add del">
-          <ac:chgData name="Rithie Natan" userId="515ab963006320ae" providerId="Windows Live" clId="Web-{4D041D26-129F-4DA4-AB9B-E21DC7DBE14F}" dt="2019-11-21T09:58:00.913" v="193"/>
-          <ac:spMkLst>
-            <pc:docMk/>
-            <pc:sldMk cId="1218809312" sldId="258"/>
-            <ac:spMk id="17" creationId="{E08D4B6A-8113-4DFB-B82E-B60CAC8E0A50}"/>
-          </ac:spMkLst>
-        </pc:spChg>
-        <pc:spChg chg="add del">
-          <ac:chgData name="Rithie Natan" userId="515ab963006320ae" providerId="Windows Live" clId="Web-{4D041D26-129F-4DA4-AB9B-E21DC7DBE14F}" dt="2019-11-21T09:58:00.913" v="193"/>
-          <ac:spMkLst>
-            <pc:docMk/>
-            <pc:sldMk cId="1218809312" sldId="258"/>
-            <ac:spMk id="19" creationId="{9822E561-F97C-4CBB-A9A6-A6BF6317BC84}"/>
-          </ac:spMkLst>
-        </pc:spChg>
-        <pc:spChg chg="add del">
-          <ac:chgData name="Rithie Natan" userId="515ab963006320ae" providerId="Windows Live" clId="Web-{4D041D26-129F-4DA4-AB9B-E21DC7DBE14F}" dt="2019-11-21T09:58:00.913" v="193"/>
-          <ac:spMkLst>
-            <pc:docMk/>
-            <pc:sldMk cId="1218809312" sldId="258"/>
-            <ac:spMk id="21" creationId="{B01B0E58-A5C8-4CDA-A2E0-35DF94E59857}"/>
-          </ac:spMkLst>
-        </pc:spChg>
-        <pc:spChg chg="add del">
-          <ac:chgData name="Rithie Natan" userId="515ab963006320ae" providerId="Windows Live" clId="Web-{4D041D26-129F-4DA4-AB9B-E21DC7DBE14F}" dt="2019-11-21T09:57:52.194" v="192"/>
-          <ac:spMkLst>
-            <pc:docMk/>
-            <pc:sldMk cId="1218809312" sldId="258"/>
-            <ac:spMk id="23" creationId="{DD651B61-325E-4E73-8445-38B0DE8AAAB6}"/>
-          </ac:spMkLst>
-        </pc:spChg>
-        <pc:spChg chg="add del">
-          <ac:chgData name="Rithie Natan" userId="515ab963006320ae" providerId="Windows Live" clId="Web-{4D041D26-129F-4DA4-AB9B-E21DC7DBE14F}" dt="2019-11-21T09:57:52.194" v="192"/>
-          <ac:spMkLst>
-            <pc:docMk/>
-            <pc:sldMk cId="1218809312" sldId="258"/>
-            <ac:spMk id="24" creationId="{B42E5253-D3AC-4AC2-B766-8B34F13C2F5E}"/>
-          </ac:spMkLst>
-        </pc:spChg>
-        <pc:spChg chg="add del">
-          <ac:chgData name="Rithie Natan" userId="515ab963006320ae" providerId="Windows Live" clId="Web-{4D041D26-129F-4DA4-AB9B-E21DC7DBE14F}" dt="2019-11-21T09:57:52.194" v="192"/>
-          <ac:spMkLst>
-            <pc:docMk/>
-            <pc:sldMk cId="1218809312" sldId="258"/>
-            <ac:spMk id="25" creationId="{10AE8D57-436A-4073-9A75-15BB5949F8B4}"/>
-          </ac:spMkLst>
-        </pc:spChg>
-        <pc:spChg chg="add del">
-          <ac:chgData name="Rithie Natan" userId="515ab963006320ae" providerId="Windows Live" clId="Web-{4D041D26-129F-4DA4-AB9B-E21DC7DBE14F}" dt="2019-11-21T09:57:50.413" v="190"/>
-          <ac:spMkLst>
-            <pc:docMk/>
-            <pc:sldMk cId="1218809312" sldId="258"/>
-            <ac:spMk id="26" creationId="{DD651B61-325E-4E73-8445-38B0DE8AAAB6}"/>
-          </ac:spMkLst>
-        </pc:spChg>
-        <pc:spChg chg="add del">
-          <ac:chgData name="Rithie Natan" userId="515ab963006320ae" providerId="Windows Live" clId="Web-{4D041D26-129F-4DA4-AB9B-E21DC7DBE14F}" dt="2019-11-21T09:57:52.194" v="192"/>
-          <ac:spMkLst>
-            <pc:docMk/>
-            <pc:sldMk cId="1218809312" sldId="258"/>
-            <ac:spMk id="27" creationId="{E2852671-8EB6-4EAF-8AF8-65CF3FD66456}"/>
-          </ac:spMkLst>
-        </pc:spChg>
-        <pc:spChg chg="add del">
-          <ac:chgData name="Rithie Natan" userId="515ab963006320ae" providerId="Windows Live" clId="Web-{4D041D26-129F-4DA4-AB9B-E21DC7DBE14F}" dt="2019-11-21T09:57:50.413" v="190"/>
-          <ac:spMkLst>
-            <pc:docMk/>
-            <pc:sldMk cId="1218809312" sldId="258"/>
-            <ac:spMk id="28" creationId="{B42E5253-D3AC-4AC2-B766-8B34F13C2F5E}"/>
-          </ac:spMkLst>
-        </pc:spChg>
-        <pc:spChg chg="add del">
-          <ac:chgData name="Rithie Natan" userId="515ab963006320ae" providerId="Windows Live" clId="Web-{4D041D26-129F-4DA4-AB9B-E21DC7DBE14F}" dt="2019-11-21T09:57:52.194" v="192"/>
-          <ac:spMkLst>
-            <pc:docMk/>
-            <pc:sldMk cId="1218809312" sldId="258"/>
-            <ac:spMk id="29" creationId="{F7207B7B-5C57-458C-BE38-95D2CD7655BB}"/>
-          </ac:spMkLst>
-        </pc:spChg>
-        <pc:spChg chg="add del">
-          <ac:chgData name="Rithie Natan" userId="515ab963006320ae" providerId="Windows Live" clId="Web-{4D041D26-129F-4DA4-AB9B-E21DC7DBE14F}" dt="2019-11-21T09:57:50.413" v="190"/>
-          <ac:spMkLst>
-            <pc:docMk/>
-            <pc:sldMk cId="1218809312" sldId="258"/>
-            <ac:spMk id="30" creationId="{10AE8D57-436A-4073-9A75-15BB5949F8B4}"/>
-          </ac:spMkLst>
-        </pc:spChg>
-        <pc:spChg chg="add del">
-          <ac:chgData name="Rithie Natan" userId="515ab963006320ae" providerId="Windows Live" clId="Web-{4D041D26-129F-4DA4-AB9B-E21DC7DBE14F}" dt="2019-11-21T09:57:52.194" v="192"/>
-          <ac:spMkLst>
-            <pc:docMk/>
-            <pc:sldMk cId="1218809312" sldId="258"/>
-            <ac:spMk id="31" creationId="{9822E561-F97C-4CBB-A9A6-A6BF6317BC84}"/>
-          </ac:spMkLst>
-        </pc:spChg>
-        <pc:spChg chg="add del">
-          <ac:chgData name="Rithie Natan" userId="515ab963006320ae" providerId="Windows Live" clId="Web-{4D041D26-129F-4DA4-AB9B-E21DC7DBE14F}" dt="2019-11-21T09:57:50.413" v="190"/>
-          <ac:spMkLst>
-            <pc:docMk/>
-            <pc:sldMk cId="1218809312" sldId="258"/>
-            <ac:spMk id="32" creationId="{E2852671-8EB6-4EAF-8AF8-65CF3FD66456}"/>
-          </ac:spMkLst>
-        </pc:spChg>
-        <pc:spChg chg="add del">
-          <ac:chgData name="Rithie Natan" userId="515ab963006320ae" providerId="Windows Live" clId="Web-{4D041D26-129F-4DA4-AB9B-E21DC7DBE14F}" dt="2019-11-21T09:57:50.413" v="190"/>
-          <ac:spMkLst>
-            <pc:docMk/>
-            <pc:sldMk cId="1218809312" sldId="258"/>
-            <ac:spMk id="34" creationId="{26B4480E-B7FF-4481-890E-043A69AE6FE2}"/>
-          </ac:spMkLst>
-        </pc:spChg>
-        <pc:spChg chg="add del">
-          <ac:chgData name="Rithie Natan" userId="515ab963006320ae" providerId="Windows Live" clId="Web-{4D041D26-129F-4DA4-AB9B-E21DC7DBE14F}" dt="2019-11-21T09:57:52.194" v="192"/>
-          <ac:spMkLst>
-            <pc:docMk/>
-            <pc:sldMk cId="1218809312" sldId="258"/>
-            <ac:spMk id="38" creationId="{B01B0E58-A5C8-4CDA-A2E0-35DF94E59857}"/>
-          </ac:spMkLst>
-        </pc:spChg>
-        <pc:grpChg chg="add del">
-          <ac:chgData name="Rithie Natan" userId="515ab963006320ae" providerId="Windows Live" clId="Web-{4D041D26-129F-4DA4-AB9B-E21DC7DBE14F}" dt="2019-11-21T09:57:50.413" v="190"/>
-          <ac:grpSpMkLst>
-            <pc:docMk/>
-            <pc:sldMk cId="1218809312" sldId="258"/>
-            <ac:grpSpMk id="36" creationId="{79394E1F-0B5F-497D-B2A6-8383A2A54834}"/>
-          </ac:grpSpMkLst>
-        </pc:grpChg>
-        <pc:picChg chg="add mod ord">
-          <ac:chgData name="Rithie Natan" userId="515ab963006320ae" providerId="Windows Live" clId="Web-{4D041D26-129F-4DA4-AB9B-E21DC7DBE14F}" dt="2019-11-21T09:58:20.803" v="196"/>
-          <ac:picMkLst>
-            <pc:docMk/>
-            <pc:sldMk cId="1218809312" sldId="258"/>
-            <ac:picMk id="4" creationId="{E5262F09-7E81-40A7-99A0-5019CAB25F37}"/>
-          </ac:picMkLst>
-        </pc:picChg>
-      </pc:sldChg>
-      <pc:sldChg chg="addSp delSp modSp add replId">
-        <pc:chgData name="Rithie Natan" userId="515ab963006320ae" providerId="Windows Live" clId="Web-{4D041D26-129F-4DA4-AB9B-E21DC7DBE14F}" dt="2019-11-21T10:01:01.551" v="258" actId="20577"/>
-        <pc:sldMkLst>
-          <pc:docMk/>
-          <pc:sldMk cId="1077769933" sldId="259"/>
-        </pc:sldMkLst>
-        <pc:spChg chg="mod">
-          <ac:chgData name="Rithie Natan" userId="515ab963006320ae" providerId="Windows Live" clId="Web-{4D041D26-129F-4DA4-AB9B-E21DC7DBE14F}" dt="2019-11-21T10:01:01.551" v="258" actId="20577"/>
-          <ac:spMkLst>
-            <pc:docMk/>
-            <pc:sldMk cId="1077769933" sldId="259"/>
-            <ac:spMk id="8" creationId="{25A162BF-EE54-4513-8D7B-028D898525F3}"/>
-          </ac:spMkLst>
-        </pc:spChg>
-        <pc:picChg chg="add mod">
-          <ac:chgData name="Rithie Natan" userId="515ab963006320ae" providerId="Windows Live" clId="Web-{4D041D26-129F-4DA4-AB9B-E21DC7DBE14F}" dt="2019-11-21T10:00:44.489" v="238" actId="1076"/>
-          <ac:picMkLst>
-            <pc:docMk/>
-            <pc:sldMk cId="1077769933" sldId="259"/>
-            <ac:picMk id="3" creationId="{C18BCB77-156A-4E01-87A2-A3AF50AEB964}"/>
-          </ac:picMkLst>
-        </pc:picChg>
-        <pc:picChg chg="del">
-          <ac:chgData name="Rithie Natan" userId="515ab963006320ae" providerId="Windows Live" clId="Web-{4D041D26-129F-4DA4-AB9B-E21DC7DBE14F}" dt="2019-11-21T09:59:05.865" v="233"/>
-          <ac:picMkLst>
-            <pc:docMk/>
-            <pc:sldMk cId="1077769933" sldId="259"/>
-            <ac:picMk id="4" creationId="{E5262F09-7E81-40A7-99A0-5019CAB25F37}"/>
-          </ac:picMkLst>
-        </pc:picChg>
-      </pc:sldChg>
-      <pc:sldChg chg="addSp delSp modSp add replId">
-        <pc:chgData name="Rithie Natan" userId="515ab963006320ae" providerId="Windows Live" clId="Web-{4D041D26-129F-4DA4-AB9B-E21DC7DBE14F}" dt="2019-11-21T10:02:33.660" v="276" actId="1076"/>
-        <pc:sldMkLst>
-          <pc:docMk/>
-          <pc:sldMk cId="2153970996" sldId="260"/>
-        </pc:sldMkLst>
-        <pc:spChg chg="mod">
-          <ac:chgData name="Rithie Natan" userId="515ab963006320ae" providerId="Windows Live" clId="Web-{4D041D26-129F-4DA4-AB9B-E21DC7DBE14F}" dt="2019-11-21T10:01:26.082" v="263" actId="20577"/>
-          <ac:spMkLst>
-            <pc:docMk/>
-            <pc:sldMk cId="2153970996" sldId="260"/>
-            <ac:spMk id="8" creationId="{25A162BF-EE54-4513-8D7B-028D898525F3}"/>
-          </ac:spMkLst>
-        </pc:spChg>
-        <pc:picChg chg="del">
-          <ac:chgData name="Rithie Natan" userId="515ab963006320ae" providerId="Windows Live" clId="Web-{4D041D26-129F-4DA4-AB9B-E21DC7DBE14F}" dt="2019-11-21T10:01:28.317" v="266"/>
-          <ac:picMkLst>
-            <pc:docMk/>
-            <pc:sldMk cId="2153970996" sldId="260"/>
-            <ac:picMk id="3" creationId="{C18BCB77-156A-4E01-87A2-A3AF50AEB964}"/>
-          </ac:picMkLst>
-        </pc:picChg>
-        <pc:picChg chg="add mod">
-          <ac:chgData name="Rithie Natan" userId="515ab963006320ae" providerId="Windows Live" clId="Web-{4D041D26-129F-4DA4-AB9B-E21DC7DBE14F}" dt="2019-11-21T10:02:33.660" v="276" actId="1076"/>
-          <ac:picMkLst>
-            <pc:docMk/>
-            <pc:sldMk cId="2153970996" sldId="260"/>
-            <ac:picMk id="4" creationId="{B0A06D08-F1F4-4532-AA03-B1089769674B}"/>
-          </ac:picMkLst>
-        </pc:picChg>
-      </pc:sldChg>
-      <pc:sldChg chg="add replId">
-        <pc:chgData name="Rithie Natan" userId="515ab963006320ae" providerId="Windows Live" clId="Web-{4D041D26-129F-4DA4-AB9B-E21DC7DBE14F}" dt="2019-11-21T10:02:40.519" v="277"/>
-        <pc:sldMkLst>
-          <pc:docMk/>
-          <pc:sldMk cId="515840283" sldId="261"/>
-        </pc:sldMkLst>
-      </pc:sldChg>
-      <pc:sldChg chg="addSp delSp modSp add replId">
-        <pc:chgData name="Rithie Natan" userId="515ab963006320ae" providerId="Windows Live" clId="Web-{4D041D26-129F-4DA4-AB9B-E21DC7DBE14F}" dt="2019-11-21T10:06:50.548" v="298" actId="1076"/>
-        <pc:sldMkLst>
-          <pc:docMk/>
-          <pc:sldMk cId="2784600737" sldId="262"/>
-        </pc:sldMkLst>
-        <pc:spChg chg="mod">
-          <ac:chgData name="Rithie Natan" userId="515ab963006320ae" providerId="Windows Live" clId="Web-{4D041D26-129F-4DA4-AB9B-E21DC7DBE14F}" dt="2019-11-21T10:06:05.001" v="289" actId="20577"/>
-          <ac:spMkLst>
-            <pc:docMk/>
-            <pc:sldMk cId="2784600737" sldId="262"/>
-            <ac:spMk id="8" creationId="{25A162BF-EE54-4513-8D7B-028D898525F3}"/>
-          </ac:spMkLst>
-        </pc:spChg>
-        <pc:picChg chg="add mod">
-          <ac:chgData name="Rithie Natan" userId="515ab963006320ae" providerId="Windows Live" clId="Web-{4D041D26-129F-4DA4-AB9B-E21DC7DBE14F}" dt="2019-11-21T10:06:50.548" v="298" actId="1076"/>
-          <ac:picMkLst>
-            <pc:docMk/>
-            <pc:sldMk cId="2784600737" sldId="262"/>
-            <ac:picMk id="3" creationId="{DAAF7B33-397C-4F3B-8ED2-FAC8268216F2}"/>
-          </ac:picMkLst>
-        </pc:picChg>
-        <pc:picChg chg="del">
-          <ac:chgData name="Rithie Natan" userId="515ab963006320ae" providerId="Windows Live" clId="Web-{4D041D26-129F-4DA4-AB9B-E21DC7DBE14F}" dt="2019-11-21T10:06:09.314" v="291"/>
-          <ac:picMkLst>
-            <pc:docMk/>
-            <pc:sldMk cId="2784600737" sldId="262"/>
-            <ac:picMk id="4" creationId="{B0A06D08-F1F4-4532-AA03-B1089769674B}"/>
-          </ac:picMkLst>
-        </pc:picChg>
-      </pc:sldChg>
-      <pc:sldChg chg="addSp delSp modSp add replId">
-        <pc:chgData name="Rithie Natan" userId="515ab963006320ae" providerId="Windows Live" clId="Web-{4D041D26-129F-4DA4-AB9B-E21DC7DBE14F}" dt="2019-11-21T10:08:48.534" v="348" actId="1076"/>
-        <pc:sldMkLst>
-          <pc:docMk/>
-          <pc:sldMk cId="2970701771" sldId="263"/>
-        </pc:sldMkLst>
-        <pc:spChg chg="mod">
-          <ac:chgData name="Rithie Natan" userId="515ab963006320ae" providerId="Windows Live" clId="Web-{4D041D26-129F-4DA4-AB9B-E21DC7DBE14F}" dt="2019-11-21T10:08:29.531" v="343" actId="20577"/>
-          <ac:spMkLst>
-            <pc:docMk/>
-            <pc:sldMk cId="2970701771" sldId="263"/>
-            <ac:spMk id="8" creationId="{25A162BF-EE54-4513-8D7B-028D898525F3}"/>
-          </ac:spMkLst>
-        </pc:spChg>
-        <pc:picChg chg="del">
-          <ac:chgData name="Rithie Natan" userId="515ab963006320ae" providerId="Windows Live" clId="Web-{4D041D26-129F-4DA4-AB9B-E21DC7DBE14F}" dt="2019-11-21T10:08:31.890" v="346"/>
-          <ac:picMkLst>
-            <pc:docMk/>
-            <pc:sldMk cId="2970701771" sldId="263"/>
-            <ac:picMk id="3" creationId="{DAAF7B33-397C-4F3B-8ED2-FAC8268216F2}"/>
-          </ac:picMkLst>
-        </pc:picChg>
-        <pc:picChg chg="add mod">
-          <ac:chgData name="Rithie Natan" userId="515ab963006320ae" providerId="Windows Live" clId="Web-{4D041D26-129F-4DA4-AB9B-E21DC7DBE14F}" dt="2019-11-21T10:08:48.534" v="348" actId="1076"/>
-          <ac:picMkLst>
-            <pc:docMk/>
-            <pc:sldMk cId="2970701771" sldId="263"/>
-            <ac:picMk id="4" creationId="{DFB0825B-6F4C-4502-8B81-471C10D19500}"/>
-          </ac:picMkLst>
-        </pc:picChg>
-      </pc:sldChg>
-      <pc:sldChg chg="addSp delSp modSp add replId">
-        <pc:chgData name="Rithie Natan" userId="515ab963006320ae" providerId="Windows Live" clId="Web-{4D041D26-129F-4DA4-AB9B-E21DC7DBE14F}" dt="2019-11-21T10:10:17.330" v="364" actId="1076"/>
-        <pc:sldMkLst>
-          <pc:docMk/>
-          <pc:sldMk cId="1905684057" sldId="264"/>
-        </pc:sldMkLst>
-        <pc:spChg chg="mod">
-          <ac:chgData name="Rithie Natan" userId="515ab963006320ae" providerId="Windows Live" clId="Web-{4D041D26-129F-4DA4-AB9B-E21DC7DBE14F}" dt="2019-11-21T10:09:34.268" v="354" actId="20577"/>
-          <ac:spMkLst>
-            <pc:docMk/>
-            <pc:sldMk cId="1905684057" sldId="264"/>
-            <ac:spMk id="8" creationId="{25A162BF-EE54-4513-8D7B-028D898525F3}"/>
-          </ac:spMkLst>
-        </pc:spChg>
-        <pc:picChg chg="add mod">
-          <ac:chgData name="Rithie Natan" userId="515ab963006320ae" providerId="Windows Live" clId="Web-{4D041D26-129F-4DA4-AB9B-E21DC7DBE14F}" dt="2019-11-21T10:10:17.330" v="364" actId="1076"/>
-          <ac:picMkLst>
-            <pc:docMk/>
-            <pc:sldMk cId="1905684057" sldId="264"/>
-            <ac:picMk id="3" creationId="{1B0A4725-2C9C-4F3E-B099-A54E32DE38A0}"/>
-          </ac:picMkLst>
-        </pc:picChg>
-        <pc:picChg chg="del">
-          <ac:chgData name="Rithie Natan" userId="515ab963006320ae" providerId="Windows Live" clId="Web-{4D041D26-129F-4DA4-AB9B-E21DC7DBE14F}" dt="2019-11-21T10:09:35.534" v="357"/>
-          <ac:picMkLst>
-            <pc:docMk/>
-            <pc:sldMk cId="1905684057" sldId="264"/>
-            <ac:picMk id="4" creationId="{DFB0825B-6F4C-4502-8B81-471C10D19500}"/>
-          </ac:picMkLst>
-        </pc:picChg>
-      </pc:sldChg>
-      <pc:sldChg chg="addSp delSp modSp add replId">
-        <pc:chgData name="Rithie Natan" userId="515ab963006320ae" providerId="Windows Live" clId="Web-{4D041D26-129F-4DA4-AB9B-E21DC7DBE14F}" dt="2019-11-21T10:15:52.780" v="399" actId="1076"/>
-        <pc:sldMkLst>
-          <pc:docMk/>
-          <pc:sldMk cId="2515141805" sldId="265"/>
-        </pc:sldMkLst>
-        <pc:spChg chg="mod">
-          <ac:chgData name="Rithie Natan" userId="515ab963006320ae" providerId="Windows Live" clId="Web-{4D041D26-129F-4DA4-AB9B-E21DC7DBE14F}" dt="2019-11-21T10:10:32.908" v="377" actId="20577"/>
-          <ac:spMkLst>
-            <pc:docMk/>
-            <pc:sldMk cId="2515141805" sldId="265"/>
-            <ac:spMk id="8" creationId="{25A162BF-EE54-4513-8D7B-028D898525F3}"/>
-          </ac:spMkLst>
-        </pc:spChg>
-        <pc:picChg chg="del">
-          <ac:chgData name="Rithie Natan" userId="515ab963006320ae" providerId="Windows Live" clId="Web-{4D041D26-129F-4DA4-AB9B-E21DC7DBE14F}" dt="2019-11-21T10:10:26.158" v="366"/>
-          <ac:picMkLst>
-            <pc:docMk/>
-            <pc:sldMk cId="2515141805" sldId="265"/>
-            <ac:picMk id="3" creationId="{1B0A4725-2C9C-4F3E-B099-A54E32DE38A0}"/>
-          </ac:picMkLst>
-        </pc:picChg>
-        <pc:picChg chg="add del mod">
-          <ac:chgData name="Rithie Natan" userId="515ab963006320ae" providerId="Windows Live" clId="Web-{4D041D26-129F-4DA4-AB9B-E21DC7DBE14F}" dt="2019-11-21T10:14:46.749" v="388"/>
-          <ac:picMkLst>
-            <pc:docMk/>
-            <pc:sldMk cId="2515141805" sldId="265"/>
-            <ac:picMk id="4" creationId="{A2D3AD66-F7EB-447B-8BE6-CD1F21B732F7}"/>
-          </ac:picMkLst>
-        </pc:picChg>
-        <pc:picChg chg="add del mod">
-          <ac:chgData name="Rithie Natan" userId="515ab963006320ae" providerId="Windows Live" clId="Web-{4D041D26-129F-4DA4-AB9B-E21DC7DBE14F}" dt="2019-11-21T10:15:24.874" v="392"/>
-          <ac:picMkLst>
-            <pc:docMk/>
-            <pc:sldMk cId="2515141805" sldId="265"/>
-            <ac:picMk id="9" creationId="{02EA4C3F-C790-4FC4-A6A5-EF731F813587}"/>
-          </ac:picMkLst>
-        </pc:picChg>
-        <pc:picChg chg="add mod">
-          <ac:chgData name="Rithie Natan" userId="515ab963006320ae" providerId="Windows Live" clId="Web-{4D041D26-129F-4DA4-AB9B-E21DC7DBE14F}" dt="2019-11-21T10:15:52.780" v="399" actId="1076"/>
-          <ac:picMkLst>
-            <pc:docMk/>
-            <pc:sldMk cId="2515141805" sldId="265"/>
-            <ac:picMk id="13" creationId="{BE98FDBD-DC91-43A6-836E-AB717367CF97}"/>
-          </ac:picMkLst>
-        </pc:picChg>
-      </pc:sldChg>
-      <pc:sldChg chg="addSp delSp modSp new mod setBg setClrOvrMap">
-        <pc:chgData name="Rithie Natan" userId="515ab963006320ae" providerId="Windows Live" clId="Web-{4D041D26-129F-4DA4-AB9B-E21DC7DBE14F}" dt="2019-11-21T10:20:57.855" v="485" actId="14100"/>
-        <pc:sldMkLst>
-          <pc:docMk/>
-          <pc:sldMk cId="2919246268" sldId="266"/>
-        </pc:sldMkLst>
-        <pc:spChg chg="mod">
-          <ac:chgData name="Rithie Natan" userId="515ab963006320ae" providerId="Windows Live" clId="Web-{4D041D26-129F-4DA4-AB9B-E21DC7DBE14F}" dt="2019-11-21T10:20:47.542" v="481"/>
-          <ac:spMkLst>
-            <pc:docMk/>
-            <pc:sldMk cId="2919246268" sldId="266"/>
-            <ac:spMk id="2" creationId="{3F116A18-87D9-4FEE-B840-7BE5F7853D83}"/>
-          </ac:spMkLst>
-        </pc:spChg>
-        <pc:spChg chg="mod">
-          <ac:chgData name="Rithie Natan" userId="515ab963006320ae" providerId="Windows Live" clId="Web-{4D041D26-129F-4DA4-AB9B-E21DC7DBE14F}" dt="2019-11-21T10:20:47.542" v="481"/>
-          <ac:spMkLst>
-            <pc:docMk/>
-            <pc:sldMk cId="2919246268" sldId="266"/>
-            <ac:spMk id="3" creationId="{EFF81A8A-1BB7-41AE-A4A5-C66525F9C12C}"/>
-          </ac:spMkLst>
-        </pc:spChg>
-        <pc:spChg chg="add del">
-          <ac:chgData name="Rithie Natan" userId="515ab963006320ae" providerId="Windows Live" clId="Web-{4D041D26-129F-4DA4-AB9B-E21DC7DBE14F}" dt="2019-11-21T10:20:38.355" v="480"/>
-          <ac:spMkLst>
-            <pc:docMk/>
-            <pc:sldMk cId="2919246268" sldId="266"/>
-            <ac:spMk id="6" creationId="{DD651B61-325E-4E73-8445-38B0DE8AAAB6}"/>
-          </ac:spMkLst>
-        </pc:spChg>
-        <pc:spChg chg="add del">
-          <ac:chgData name="Rithie Natan" userId="515ab963006320ae" providerId="Windows Live" clId="Web-{4D041D26-129F-4DA4-AB9B-E21DC7DBE14F}" dt="2019-11-21T10:20:38.355" v="480"/>
-          <ac:spMkLst>
-            <pc:docMk/>
-            <pc:sldMk cId="2919246268" sldId="266"/>
-            <ac:spMk id="7" creationId="{B42E5253-D3AC-4AC2-B766-8B34F13C2F5E}"/>
-          </ac:spMkLst>
-        </pc:spChg>
-        <pc:spChg chg="add del">
-          <ac:chgData name="Rithie Natan" userId="515ab963006320ae" providerId="Windows Live" clId="Web-{4D041D26-129F-4DA4-AB9B-E21DC7DBE14F}" dt="2019-11-21T10:20:38.355" v="480"/>
-          <ac:spMkLst>
-            <pc:docMk/>
-            <pc:sldMk cId="2919246268" sldId="266"/>
-            <ac:spMk id="8" creationId="{10AE8D57-436A-4073-9A75-15BB5949F8B4}"/>
-          </ac:spMkLst>
-        </pc:spChg>
-        <pc:spChg chg="add del">
-          <ac:chgData name="Rithie Natan" userId="515ab963006320ae" providerId="Windows Live" clId="Web-{4D041D26-129F-4DA4-AB9B-E21DC7DBE14F}" dt="2019-11-21T10:20:31.714" v="478"/>
-          <ac:spMkLst>
-            <pc:docMk/>
-            <pc:sldMk cId="2919246268" sldId="266"/>
-            <ac:spMk id="9" creationId="{E6C8E6EB-4C59-429B-97E4-72A058CFC4FB}"/>
-          </ac:spMkLst>
-        </pc:spChg>
-        <pc:spChg chg="add del">
-          <ac:chgData name="Rithie Natan" userId="515ab963006320ae" providerId="Windows Live" clId="Web-{4D041D26-129F-4DA4-AB9B-E21DC7DBE14F}" dt="2019-11-21T10:20:38.355" v="480"/>
-          <ac:spMkLst>
-            <pc:docMk/>
-            <pc:sldMk cId="2919246268" sldId="266"/>
-            <ac:spMk id="10" creationId="{E2852671-8EB6-4EAF-8AF8-65CF3FD66456}"/>
-          </ac:spMkLst>
-        </pc:spChg>
-        <pc:spChg chg="add del">
-          <ac:chgData name="Rithie Natan" userId="515ab963006320ae" providerId="Windows Live" clId="Web-{4D041D26-129F-4DA4-AB9B-E21DC7DBE14F}" dt="2019-11-21T10:20:31.714" v="478"/>
-          <ac:spMkLst>
-            <pc:docMk/>
-            <pc:sldMk cId="2919246268" sldId="266"/>
-            <ac:spMk id="11" creationId="{B5B90362-AFCC-46A9-B41C-A257A8C5B314}"/>
-          </ac:spMkLst>
-        </pc:spChg>
-        <pc:spChg chg="add del">
-          <ac:chgData name="Rithie Natan" userId="515ab963006320ae" providerId="Windows Live" clId="Web-{4D041D26-129F-4DA4-AB9B-E21DC7DBE14F}" dt="2019-11-21T10:20:38.355" v="480"/>
-          <ac:spMkLst>
-            <pc:docMk/>
-            <pc:sldMk cId="2919246268" sldId="266"/>
-            <ac:spMk id="12" creationId="{26B4480E-B7FF-4481-890E-043A69AE6FE2}"/>
-          </ac:spMkLst>
-        </pc:spChg>
-        <pc:spChg chg="add del">
-          <ac:chgData name="Rithie Natan" userId="515ab963006320ae" providerId="Windows Live" clId="Web-{4D041D26-129F-4DA4-AB9B-E21DC7DBE14F}" dt="2019-11-21T10:20:31.714" v="478"/>
-          <ac:spMkLst>
-            <pc:docMk/>
-            <pc:sldMk cId="2919246268" sldId="266"/>
-            <ac:spMk id="13" creationId="{F71EF7F1-38BA-471D-8CD4-2A9AE8E35527}"/>
-          </ac:spMkLst>
-        </pc:spChg>
-        <pc:spChg chg="add del">
-          <ac:chgData name="Rithie Natan" userId="515ab963006320ae" providerId="Windows Live" clId="Web-{4D041D26-129F-4DA4-AB9B-E21DC7DBE14F}" dt="2019-11-21T10:20:38.355" v="480"/>
-          <ac:spMkLst>
-            <pc:docMk/>
-            <pc:sldMk cId="2919246268" sldId="266"/>
-            <ac:spMk id="14" creationId="{8C2840C6-6494-4E12-A428-2012DA7DDF8A}"/>
-          </ac:spMkLst>
-        </pc:spChg>
-        <pc:spChg chg="add del">
-          <ac:chgData name="Rithie Natan" userId="515ab963006320ae" providerId="Windows Live" clId="Web-{4D041D26-129F-4DA4-AB9B-E21DC7DBE14F}" dt="2019-11-21T10:20:31.714" v="478"/>
-          <ac:spMkLst>
-            <pc:docMk/>
-            <pc:sldMk cId="2919246268" sldId="266"/>
-            <ac:spMk id="15" creationId="{C0524398-BFB4-4C4A-8317-83B8729F9B26}"/>
-          </ac:spMkLst>
-        </pc:spChg>
-        <pc:spChg chg="add del">
-          <ac:chgData name="Rithie Natan" userId="515ab963006320ae" providerId="Windows Live" clId="Web-{4D041D26-129F-4DA4-AB9B-E21DC7DBE14F}" dt="2019-11-21T10:20:38.355" v="480"/>
-          <ac:spMkLst>
-            <pc:docMk/>
-            <pc:sldMk cId="2919246268" sldId="266"/>
-            <ac:spMk id="16" creationId="{8CF5084D-B617-4011-8406-A93B64723187}"/>
-          </ac:spMkLst>
-        </pc:spChg>
-        <pc:spChg chg="add del">
-          <ac:chgData name="Rithie Natan" userId="515ab963006320ae" providerId="Windows Live" clId="Web-{4D041D26-129F-4DA4-AB9B-E21DC7DBE14F}" dt="2019-11-21T10:20:31.714" v="478"/>
-          <ac:spMkLst>
-            <pc:docMk/>
-            <pc:sldMk cId="2919246268" sldId="266"/>
-            <ac:spMk id="17" creationId="{E08D4B6A-8113-4DFB-B82E-B60CAC8E0A50}"/>
-          </ac:spMkLst>
-        </pc:spChg>
-        <pc:spChg chg="add">
-          <ac:chgData name="Rithie Natan" userId="515ab963006320ae" providerId="Windows Live" clId="Web-{4D041D26-129F-4DA4-AB9B-E21DC7DBE14F}" dt="2019-11-21T10:20:47.542" v="481"/>
-          <ac:spMkLst>
-            <pc:docMk/>
-            <pc:sldMk cId="2919246268" sldId="266"/>
-            <ac:spMk id="18" creationId="{E6C8E6EB-4C59-429B-97E4-72A058CFC4FB}"/>
-          </ac:spMkLst>
-        </pc:spChg>
-        <pc:spChg chg="add del">
-          <ac:chgData name="Rithie Natan" userId="515ab963006320ae" providerId="Windows Live" clId="Web-{4D041D26-129F-4DA4-AB9B-E21DC7DBE14F}" dt="2019-11-21T10:20:31.714" v="478"/>
-          <ac:spMkLst>
-            <pc:docMk/>
-            <pc:sldMk cId="2919246268" sldId="266"/>
-            <ac:spMk id="19" creationId="{9822E561-F97C-4CBB-A9A6-A6BF6317BC84}"/>
-          </ac:spMkLst>
-        </pc:spChg>
-        <pc:spChg chg="add">
-          <ac:chgData name="Rithie Natan" userId="515ab963006320ae" providerId="Windows Live" clId="Web-{4D041D26-129F-4DA4-AB9B-E21DC7DBE14F}" dt="2019-11-21T10:20:47.542" v="481"/>
-          <ac:spMkLst>
-            <pc:docMk/>
-            <pc:sldMk cId="2919246268" sldId="266"/>
-            <ac:spMk id="20" creationId="{B5B90362-AFCC-46A9-B41C-A257A8C5B314}"/>
-          </ac:spMkLst>
-        </pc:spChg>
-        <pc:spChg chg="add del">
-          <ac:chgData name="Rithie Natan" userId="515ab963006320ae" providerId="Windows Live" clId="Web-{4D041D26-129F-4DA4-AB9B-E21DC7DBE14F}" dt="2019-11-21T10:20:31.714" v="478"/>
-          <ac:spMkLst>
-            <pc:docMk/>
-            <pc:sldMk cId="2919246268" sldId="266"/>
-            <ac:spMk id="21" creationId="{B01B0E58-A5C8-4CDA-A2E0-35DF94E59857}"/>
-          </ac:spMkLst>
-        </pc:spChg>
-        <pc:spChg chg="add">
-          <ac:chgData name="Rithie Natan" userId="515ab963006320ae" providerId="Windows Live" clId="Web-{4D041D26-129F-4DA4-AB9B-E21DC7DBE14F}" dt="2019-11-21T10:20:47.542" v="481"/>
-          <ac:spMkLst>
-            <pc:docMk/>
-            <pc:sldMk cId="2919246268" sldId="266"/>
-            <ac:spMk id="22" creationId="{F71EF7F1-38BA-471D-8CD4-2A9AE8E35527}"/>
-          </ac:spMkLst>
-        </pc:spChg>
-        <pc:spChg chg="add">
-          <ac:chgData name="Rithie Natan" userId="515ab963006320ae" providerId="Windows Live" clId="Web-{4D041D26-129F-4DA4-AB9B-E21DC7DBE14F}" dt="2019-11-21T10:20:47.542" v="481"/>
-          <ac:spMkLst>
-            <pc:docMk/>
-            <pc:sldMk cId="2919246268" sldId="266"/>
-            <ac:spMk id="23" creationId="{C0524398-BFB4-4C4A-8317-83B8729F9B26}"/>
-          </ac:spMkLst>
-        </pc:spChg>
-        <pc:spChg chg="add">
-          <ac:chgData name="Rithie Natan" userId="515ab963006320ae" providerId="Windows Live" clId="Web-{4D041D26-129F-4DA4-AB9B-E21DC7DBE14F}" dt="2019-11-21T10:20:47.542" v="481"/>
-          <ac:spMkLst>
-            <pc:docMk/>
-            <pc:sldMk cId="2919246268" sldId="266"/>
-            <ac:spMk id="24" creationId="{E08D4B6A-8113-4DFB-B82E-B60CAC8E0A50}"/>
-          </ac:spMkLst>
-        </pc:spChg>
-        <pc:spChg chg="add">
-          <ac:chgData name="Rithie Natan" userId="515ab963006320ae" providerId="Windows Live" clId="Web-{4D041D26-129F-4DA4-AB9B-E21DC7DBE14F}" dt="2019-11-21T10:20:47.542" v="481"/>
-          <ac:spMkLst>
-            <pc:docMk/>
-            <pc:sldMk cId="2919246268" sldId="266"/>
-            <ac:spMk id="25" creationId="{9822E561-F97C-4CBB-A9A6-A6BF6317BC84}"/>
-          </ac:spMkLst>
-        </pc:spChg>
-        <pc:spChg chg="add">
-          <ac:chgData name="Rithie Natan" userId="515ab963006320ae" providerId="Windows Live" clId="Web-{4D041D26-129F-4DA4-AB9B-E21DC7DBE14F}" dt="2019-11-21T10:20:47.542" v="481"/>
-          <ac:spMkLst>
-            <pc:docMk/>
-            <pc:sldMk cId="2919246268" sldId="266"/>
-            <ac:spMk id="26" creationId="{B01B0E58-A5C8-4CDA-A2E0-35DF94E59857}"/>
-          </ac:spMkLst>
-        </pc:spChg>
-        <pc:picChg chg="add mod">
-          <ac:chgData name="Rithie Natan" userId="515ab963006320ae" providerId="Windows Live" clId="Web-{4D041D26-129F-4DA4-AB9B-E21DC7DBE14F}" dt="2019-11-21T10:20:57.855" v="485" actId="14100"/>
-          <ac:picMkLst>
-            <pc:docMk/>
-            <pc:sldMk cId="2919246268" sldId="266"/>
-            <ac:picMk id="4" creationId="{4B02BBFC-A525-40C4-A7C0-65EB81E55A28}"/>
-          </ac:picMkLst>
-        </pc:picChg>
-      </pc:sldChg>
-      <pc:sldChg chg="add del replId">
-        <pc:chgData name="Rithie Natan" userId="515ab963006320ae" providerId="Windows Live" clId="Web-{4D041D26-129F-4DA4-AB9B-E21DC7DBE14F}" dt="2019-11-21T10:16:02.420" v="401"/>
-        <pc:sldMkLst>
-          <pc:docMk/>
-          <pc:sldMk cId="4274705985" sldId="266"/>
-        </pc:sldMkLst>
-      </pc:sldChg>
-      <pc:sldChg chg="addSp delSp modSp add replId">
-        <pc:chgData name="Rithie Natan" userId="515ab963006320ae" providerId="Windows Live" clId="Web-{4D041D26-129F-4DA4-AB9B-E21DC7DBE14F}" dt="2019-11-21T10:24:07.853" v="499"/>
-        <pc:sldMkLst>
-          <pc:docMk/>
-          <pc:sldMk cId="4008403441" sldId="267"/>
-        </pc:sldMkLst>
-        <pc:spChg chg="mod">
-          <ac:chgData name="Rithie Natan" userId="515ab963006320ae" providerId="Windows Live" clId="Web-{4D041D26-129F-4DA4-AB9B-E21DC7DBE14F}" dt="2019-11-21T10:21:29.761" v="493" actId="20577"/>
-          <ac:spMkLst>
-            <pc:docMk/>
-            <pc:sldMk cId="4008403441" sldId="267"/>
-            <ac:spMk id="3" creationId="{EFF81A8A-1BB7-41AE-A4A5-C66525F9C12C}"/>
-          </ac:spMkLst>
-        </pc:spChg>
-        <pc:spChg chg="del">
-          <ac:chgData name="Rithie Natan" userId="515ab963006320ae" providerId="Windows Live" clId="Web-{4D041D26-129F-4DA4-AB9B-E21DC7DBE14F}" dt="2019-11-21T10:24:07.853" v="499"/>
-          <ac:spMkLst>
-            <pc:docMk/>
-            <pc:sldMk cId="4008403441" sldId="267"/>
-            <ac:spMk id="18" creationId="{E6C8E6EB-4C59-429B-97E4-72A058CFC4FB}"/>
-          </ac:spMkLst>
-        </pc:spChg>
-        <pc:spChg chg="del">
-          <ac:chgData name="Rithie Natan" userId="515ab963006320ae" providerId="Windows Live" clId="Web-{4D041D26-129F-4DA4-AB9B-E21DC7DBE14F}" dt="2019-11-21T10:24:07.853" v="499"/>
-          <ac:spMkLst>
-            <pc:docMk/>
-            <pc:sldMk cId="4008403441" sldId="267"/>
-            <ac:spMk id="20" creationId="{B5B90362-AFCC-46A9-B41C-A257A8C5B314}"/>
-          </ac:spMkLst>
-        </pc:spChg>
-        <pc:spChg chg="del">
-          <ac:chgData name="Rithie Natan" userId="515ab963006320ae" providerId="Windows Live" clId="Web-{4D041D26-129F-4DA4-AB9B-E21DC7DBE14F}" dt="2019-11-21T10:24:07.853" v="499"/>
-          <ac:spMkLst>
-            <pc:docMk/>
-            <pc:sldMk cId="4008403441" sldId="267"/>
-            <ac:spMk id="22" creationId="{F71EF7F1-38BA-471D-8CD4-2A9AE8E35527}"/>
-          </ac:spMkLst>
-        </pc:spChg>
-        <pc:spChg chg="del">
-          <ac:chgData name="Rithie Natan" userId="515ab963006320ae" providerId="Windows Live" clId="Web-{4D041D26-129F-4DA4-AB9B-E21DC7DBE14F}" dt="2019-11-21T10:24:07.853" v="499"/>
-          <ac:spMkLst>
-            <pc:docMk/>
-            <pc:sldMk cId="4008403441" sldId="267"/>
-            <ac:spMk id="23" creationId="{C0524398-BFB4-4C4A-8317-83B8729F9B26}"/>
-          </ac:spMkLst>
-        </pc:spChg>
-        <pc:spChg chg="del">
-          <ac:chgData name="Rithie Natan" userId="515ab963006320ae" providerId="Windows Live" clId="Web-{4D041D26-129F-4DA4-AB9B-E21DC7DBE14F}" dt="2019-11-21T10:24:07.853" v="499"/>
-          <ac:spMkLst>
-            <pc:docMk/>
-            <pc:sldMk cId="4008403441" sldId="267"/>
-            <ac:spMk id="24" creationId="{E08D4B6A-8113-4DFB-B82E-B60CAC8E0A50}"/>
-          </ac:spMkLst>
-        </pc:spChg>
-        <pc:spChg chg="del">
-          <ac:chgData name="Rithie Natan" userId="515ab963006320ae" providerId="Windows Live" clId="Web-{4D041D26-129F-4DA4-AB9B-E21DC7DBE14F}" dt="2019-11-21T10:24:07.853" v="499"/>
-          <ac:spMkLst>
-            <pc:docMk/>
-            <pc:sldMk cId="4008403441" sldId="267"/>
-            <ac:spMk id="25" creationId="{9822E561-F97C-4CBB-A9A6-A6BF6317BC84}"/>
-          </ac:spMkLst>
-        </pc:spChg>
-        <pc:spChg chg="del">
-          <ac:chgData name="Rithie Natan" userId="515ab963006320ae" providerId="Windows Live" clId="Web-{4D041D26-129F-4DA4-AB9B-E21DC7DBE14F}" dt="2019-11-21T10:24:07.853" v="499"/>
-          <ac:spMkLst>
-            <pc:docMk/>
-            <pc:sldMk cId="4008403441" sldId="267"/>
-            <ac:spMk id="26" creationId="{B01B0E58-A5C8-4CDA-A2E0-35DF94E59857}"/>
-          </ac:spMkLst>
-        </pc:spChg>
-        <pc:spChg chg="add">
-          <ac:chgData name="Rithie Natan" userId="515ab963006320ae" providerId="Windows Live" clId="Web-{4D041D26-129F-4DA4-AB9B-E21DC7DBE14F}" dt="2019-11-21T10:24:07.853" v="499"/>
-          <ac:spMkLst>
-            <pc:docMk/>
-            <pc:sldMk cId="4008403441" sldId="267"/>
-            <ac:spMk id="31" creationId="{E6C8E6EB-4C59-429B-97E4-72A058CFC4FB}"/>
-          </ac:spMkLst>
-        </pc:spChg>
-        <pc:spChg chg="add">
-          <ac:chgData name="Rithie Natan" userId="515ab963006320ae" providerId="Windows Live" clId="Web-{4D041D26-129F-4DA4-AB9B-E21DC7DBE14F}" dt="2019-11-21T10:24:07.853" v="499"/>
-          <ac:spMkLst>
-            <pc:docMk/>
-            <pc:sldMk cId="4008403441" sldId="267"/>
-            <ac:spMk id="33" creationId="{B5B90362-AFCC-46A9-B41C-A257A8C5B314}"/>
-          </ac:spMkLst>
-        </pc:spChg>
-        <pc:spChg chg="add">
-          <ac:chgData name="Rithie Natan" userId="515ab963006320ae" providerId="Windows Live" clId="Web-{4D041D26-129F-4DA4-AB9B-E21DC7DBE14F}" dt="2019-11-21T10:24:07.853" v="499"/>
-          <ac:spMkLst>
-            <pc:docMk/>
-            <pc:sldMk cId="4008403441" sldId="267"/>
-            <ac:spMk id="35" creationId="{F71EF7F1-38BA-471D-8CD4-2A9AE8E35527}"/>
-          </ac:spMkLst>
-        </pc:spChg>
-        <pc:spChg chg="add">
-          <ac:chgData name="Rithie Natan" userId="515ab963006320ae" providerId="Windows Live" clId="Web-{4D041D26-129F-4DA4-AB9B-E21DC7DBE14F}" dt="2019-11-21T10:24:07.853" v="499"/>
-          <ac:spMkLst>
-            <pc:docMk/>
-            <pc:sldMk cId="4008403441" sldId="267"/>
-            <ac:spMk id="37" creationId="{C0524398-BFB4-4C4A-8317-83B8729F9B26}"/>
-          </ac:spMkLst>
-        </pc:spChg>
-        <pc:spChg chg="add">
-          <ac:chgData name="Rithie Natan" userId="515ab963006320ae" providerId="Windows Live" clId="Web-{4D041D26-129F-4DA4-AB9B-E21DC7DBE14F}" dt="2019-11-21T10:24:07.853" v="499"/>
-          <ac:spMkLst>
-            <pc:docMk/>
-            <pc:sldMk cId="4008403441" sldId="267"/>
-            <ac:spMk id="39" creationId="{E08D4B6A-8113-4DFB-B82E-B60CAC8E0A50}"/>
-          </ac:spMkLst>
-        </pc:spChg>
-        <pc:spChg chg="add">
-          <ac:chgData name="Rithie Natan" userId="515ab963006320ae" providerId="Windows Live" clId="Web-{4D041D26-129F-4DA4-AB9B-E21DC7DBE14F}" dt="2019-11-21T10:24:07.853" v="499"/>
-          <ac:spMkLst>
-            <pc:docMk/>
-            <pc:sldMk cId="4008403441" sldId="267"/>
-            <ac:spMk id="41" creationId="{9822E561-F97C-4CBB-A9A6-A6BF6317BC84}"/>
-          </ac:spMkLst>
-        </pc:spChg>
-        <pc:spChg chg="add">
-          <ac:chgData name="Rithie Natan" userId="515ab963006320ae" providerId="Windows Live" clId="Web-{4D041D26-129F-4DA4-AB9B-E21DC7DBE14F}" dt="2019-11-21T10:24:07.853" v="499"/>
-          <ac:spMkLst>
-            <pc:docMk/>
-            <pc:sldMk cId="4008403441" sldId="267"/>
-            <ac:spMk id="43" creationId="{B01B0E58-A5C8-4CDA-A2E0-35DF94E59857}"/>
-          </ac:spMkLst>
-        </pc:spChg>
-        <pc:picChg chg="del">
-          <ac:chgData name="Rithie Natan" userId="515ab963006320ae" providerId="Windows Live" clId="Web-{4D041D26-129F-4DA4-AB9B-E21DC7DBE14F}" dt="2019-11-21T10:21:33.636" v="496"/>
-          <ac:picMkLst>
-            <pc:docMk/>
-            <pc:sldMk cId="4008403441" sldId="267"/>
-            <ac:picMk id="4" creationId="{4B02BBFC-A525-40C4-A7C0-65EB81E55A28}"/>
-          </ac:picMkLst>
-        </pc:picChg>
-        <pc:picChg chg="add mod">
-          <ac:chgData name="Rithie Natan" userId="515ab963006320ae" providerId="Windows Live" clId="Web-{4D041D26-129F-4DA4-AB9B-E21DC7DBE14F}" dt="2019-11-21T10:24:07.853" v="499"/>
-          <ac:picMkLst>
-            <pc:docMk/>
-            <pc:sldMk cId="4008403441" sldId="267"/>
-            <ac:picMk id="5" creationId="{E40F2873-A552-4E59-81C7-8D7B38C7C210}"/>
-          </ac:picMkLst>
-        </pc:picChg>
-      </pc:sldChg>
-      <pc:sldChg chg="addSp delSp modSp add replId">
-        <pc:chgData name="Rithie Natan" userId="515ab963006320ae" providerId="Windows Live" clId="Web-{4D041D26-129F-4DA4-AB9B-E21DC7DBE14F}" dt="2019-11-21T10:27:52.479" v="513" actId="1076"/>
-        <pc:sldMkLst>
-          <pc:docMk/>
-          <pc:sldMk cId="460880390" sldId="268"/>
-        </pc:sldMkLst>
-        <pc:spChg chg="mod">
-          <ac:chgData name="Rithie Natan" userId="515ab963006320ae" providerId="Windows Live" clId="Web-{4D041D26-129F-4DA4-AB9B-E21DC7DBE14F}" dt="2019-11-21T10:24:38.872" v="505" actId="20577"/>
-          <ac:spMkLst>
-            <pc:docMk/>
-            <pc:sldMk cId="460880390" sldId="268"/>
-            <ac:spMk id="3" creationId="{EFF81A8A-1BB7-41AE-A4A5-C66525F9C12C}"/>
-          </ac:spMkLst>
-        </pc:spChg>
-        <pc:picChg chg="add mod">
-          <ac:chgData name="Rithie Natan" userId="515ab963006320ae" providerId="Windows Live" clId="Web-{4D041D26-129F-4DA4-AB9B-E21DC7DBE14F}" dt="2019-11-21T10:27:52.479" v="513" actId="1076"/>
-          <ac:picMkLst>
-            <pc:docMk/>
-            <pc:sldMk cId="460880390" sldId="268"/>
-            <ac:picMk id="4" creationId="{6839D0D5-B32D-4D90-8941-2340E2F848E1}"/>
-          </ac:picMkLst>
-        </pc:picChg>
-        <pc:picChg chg="del">
-          <ac:chgData name="Rithie Natan" userId="515ab963006320ae" providerId="Windows Live" clId="Web-{4D041D26-129F-4DA4-AB9B-E21DC7DBE14F}" dt="2019-11-21T10:24:44.200" v="508"/>
-          <ac:picMkLst>
-            <pc:docMk/>
-            <pc:sldMk cId="460880390" sldId="268"/>
-            <ac:picMk id="5" creationId="{E40F2873-A552-4E59-81C7-8D7B38C7C210}"/>
-          </ac:picMkLst>
-        </pc:picChg>
-      </pc:sldChg>
-      <pc:sldChg chg="add del replId">
-        <pc:chgData name="Rithie Natan" userId="515ab963006320ae" providerId="Windows Live" clId="Web-{4D041D26-129F-4DA4-AB9B-E21DC7DBE14F}" dt="2019-11-21T10:29:54.322" v="517"/>
-        <pc:sldMkLst>
-          <pc:docMk/>
-          <pc:sldMk cId="158825267" sldId="269"/>
-        </pc:sldMkLst>
-      </pc:sldChg>
-      <pc:sldChg chg="modSp new">
-        <pc:chgData name="Rithie Natan" userId="515ab963006320ae" providerId="Windows Live" clId="Web-{4D041D26-129F-4DA4-AB9B-E21DC7DBE14F}" dt="2019-11-21T10:32:58.476" v="900" actId="20577"/>
-        <pc:sldMkLst>
-          <pc:docMk/>
-          <pc:sldMk cId="3552082661" sldId="269"/>
-        </pc:sldMkLst>
-        <pc:spChg chg="mod">
-          <ac:chgData name="Rithie Natan" userId="515ab963006320ae" providerId="Windows Live" clId="Web-{4D041D26-129F-4DA4-AB9B-E21DC7DBE14F}" dt="2019-11-21T10:30:22.150" v="562" actId="20577"/>
-          <ac:spMkLst>
-            <pc:docMk/>
-            <pc:sldMk cId="3552082661" sldId="269"/>
-            <ac:spMk id="2" creationId="{8CE0BD6B-F095-47B4-8FD0-4B5EA37F7D74}"/>
-          </ac:spMkLst>
-        </pc:spChg>
-        <pc:spChg chg="mod">
-          <ac:chgData name="Rithie Natan" userId="515ab963006320ae" providerId="Windows Live" clId="Web-{4D041D26-129F-4DA4-AB9B-E21DC7DBE14F}" dt="2019-11-21T10:32:58.476" v="900" actId="20577"/>
-          <ac:spMkLst>
-            <pc:docMk/>
-            <pc:sldMk cId="3552082661" sldId="269"/>
-            <ac:spMk id="3" creationId="{85022942-8C3D-4396-BFAD-F738E5643B87}"/>
-          </ac:spMkLst>
-        </pc:spChg>
-      </pc:sldChg>
-      <pc:sldChg chg="add del replId">
-        <pc:chgData name="Rithie Natan" userId="515ab963006320ae" providerId="Windows Live" clId="Web-{4D041D26-129F-4DA4-AB9B-E21DC7DBE14F}" dt="2019-11-21T10:29:47.353" v="516"/>
-        <pc:sldMkLst>
-          <pc:docMk/>
-          <pc:sldMk cId="2996561429" sldId="270"/>
-        </pc:sldMkLst>
-      </pc:sldChg>
-      <pc:sldMasterChg chg="del delSldLayout">
-        <pc:chgData name="Rithie Natan" userId="515ab963006320ae" providerId="Windows Live" clId="Web-{4D041D26-129F-4DA4-AB9B-E21DC7DBE14F}" dt="2019-11-21T09:47:53.287" v="0"/>
-        <pc:sldMasterMkLst>
-          <pc:docMk/>
-          <pc:sldMasterMk cId="2675746937" sldId="2147483648"/>
-        </pc:sldMasterMkLst>
-        <pc:sldLayoutChg chg="del">
-          <pc:chgData name="Rithie Natan" userId="515ab963006320ae" providerId="Windows Live" clId="Web-{4D041D26-129F-4DA4-AB9B-E21DC7DBE14F}" dt="2019-11-21T09:47:53.287" v="0"/>
-          <pc:sldLayoutMkLst>
-            <pc:docMk/>
-            <pc:sldMasterMk cId="2675746937" sldId="2147483648"/>
-            <pc:sldLayoutMk cId="877683876" sldId="2147483649"/>
-          </pc:sldLayoutMkLst>
-        </pc:sldLayoutChg>
-        <pc:sldLayoutChg chg="del">
-          <pc:chgData name="Rithie Natan" userId="515ab963006320ae" providerId="Windows Live" clId="Web-{4D041D26-129F-4DA4-AB9B-E21DC7DBE14F}" dt="2019-11-21T09:47:53.287" v="0"/>
-          <pc:sldLayoutMkLst>
-            <pc:docMk/>
-            <pc:sldMasterMk cId="2675746937" sldId="2147483648"/>
-            <pc:sldLayoutMk cId="314005268" sldId="2147483650"/>
-          </pc:sldLayoutMkLst>
-        </pc:sldLayoutChg>
-        <pc:sldLayoutChg chg="del">
-          <pc:chgData name="Rithie Natan" userId="515ab963006320ae" providerId="Windows Live" clId="Web-{4D041D26-129F-4DA4-AB9B-E21DC7DBE14F}" dt="2019-11-21T09:47:53.287" v="0"/>
-          <pc:sldLayoutMkLst>
-            <pc:docMk/>
-            <pc:sldMasterMk cId="2675746937" sldId="2147483648"/>
-            <pc:sldLayoutMk cId="3781375764" sldId="2147483651"/>
-          </pc:sldLayoutMkLst>
-        </pc:sldLayoutChg>
-        <pc:sldLayoutChg chg="del">
-          <pc:chgData name="Rithie Natan" userId="515ab963006320ae" providerId="Windows Live" clId="Web-{4D041D26-129F-4DA4-AB9B-E21DC7DBE14F}" dt="2019-11-21T09:47:53.287" v="0"/>
-          <pc:sldLayoutMkLst>
-            <pc:docMk/>
-            <pc:sldMasterMk cId="2675746937" sldId="2147483648"/>
-            <pc:sldLayoutMk cId="2124613824" sldId="2147483652"/>
-          </pc:sldLayoutMkLst>
-        </pc:sldLayoutChg>
-        <pc:sldLayoutChg chg="del">
-          <pc:chgData name="Rithie Natan" userId="515ab963006320ae" providerId="Windows Live" clId="Web-{4D041D26-129F-4DA4-AB9B-E21DC7DBE14F}" dt="2019-11-21T09:47:53.287" v="0"/>
-          <pc:sldLayoutMkLst>
-            <pc:docMk/>
-            <pc:sldMasterMk cId="2675746937" sldId="2147483648"/>
-            <pc:sldLayoutMk cId="3694421058" sldId="2147483653"/>
-          </pc:sldLayoutMkLst>
-        </pc:sldLayoutChg>
-        <pc:sldLayoutChg chg="del">
-          <pc:chgData name="Rithie Natan" userId="515ab963006320ae" providerId="Windows Live" clId="Web-{4D041D26-129F-4DA4-AB9B-E21DC7DBE14F}" dt="2019-11-21T09:47:53.287" v="0"/>
-          <pc:sldLayoutMkLst>
-            <pc:docMk/>
-            <pc:sldMasterMk cId="2675746937" sldId="2147483648"/>
-            <pc:sldLayoutMk cId="3108533492" sldId="2147483654"/>
-          </pc:sldLayoutMkLst>
-        </pc:sldLayoutChg>
-        <pc:sldLayoutChg chg="del">
-          <pc:chgData name="Rithie Natan" userId="515ab963006320ae" providerId="Windows Live" clId="Web-{4D041D26-129F-4DA4-AB9B-E21DC7DBE14F}" dt="2019-11-21T09:47:53.287" v="0"/>
-          <pc:sldLayoutMkLst>
-            <pc:docMk/>
-            <pc:sldMasterMk cId="2675746937" sldId="2147483648"/>
-            <pc:sldLayoutMk cId="578281579" sldId="2147483655"/>
-          </pc:sldLayoutMkLst>
-        </pc:sldLayoutChg>
-        <pc:sldLayoutChg chg="del">
-          <pc:chgData name="Rithie Natan" userId="515ab963006320ae" providerId="Windows Live" clId="Web-{4D041D26-129F-4DA4-AB9B-E21DC7DBE14F}" dt="2019-11-21T09:47:53.287" v="0"/>
-          <pc:sldLayoutMkLst>
-            <pc:docMk/>
-            <pc:sldMasterMk cId="2675746937" sldId="2147483648"/>
-            <pc:sldLayoutMk cId="2217836567" sldId="2147483656"/>
-          </pc:sldLayoutMkLst>
-        </pc:sldLayoutChg>
-        <pc:sldLayoutChg chg="del">
-          <pc:chgData name="Rithie Natan" userId="515ab963006320ae" providerId="Windows Live" clId="Web-{4D041D26-129F-4DA4-AB9B-E21DC7DBE14F}" dt="2019-11-21T09:47:53.287" v="0"/>
-          <pc:sldLayoutMkLst>
-            <pc:docMk/>
-            <pc:sldMasterMk cId="2675746937" sldId="2147483648"/>
-            <pc:sldLayoutMk cId="2245566346" sldId="2147483657"/>
-          </pc:sldLayoutMkLst>
-        </pc:sldLayoutChg>
-        <pc:sldLayoutChg chg="del">
-          <pc:chgData name="Rithie Natan" userId="515ab963006320ae" providerId="Windows Live" clId="Web-{4D041D26-129F-4DA4-AB9B-E21DC7DBE14F}" dt="2019-11-21T09:47:53.287" v="0"/>
-          <pc:sldLayoutMkLst>
-            <pc:docMk/>
-            <pc:sldMasterMk cId="2675746937" sldId="2147483648"/>
-            <pc:sldLayoutMk cId="746588027" sldId="2147483658"/>
-          </pc:sldLayoutMkLst>
-        </pc:sldLayoutChg>
-        <pc:sldLayoutChg chg="del">
-          <pc:chgData name="Rithie Natan" userId="515ab963006320ae" providerId="Windows Live" clId="Web-{4D041D26-129F-4DA4-AB9B-E21DC7DBE14F}" dt="2019-11-21T09:47:53.287" v="0"/>
-          <pc:sldLayoutMkLst>
-            <pc:docMk/>
-            <pc:sldMasterMk cId="2675746937" sldId="2147483648"/>
-            <pc:sldLayoutMk cId="1306397509" sldId="2147483659"/>
-          </pc:sldLayoutMkLst>
-        </pc:sldLayoutChg>
-      </pc:sldMasterChg>
-      <pc:sldMasterChg chg="add addSldLayout">
-        <pc:chgData name="Rithie Natan" userId="515ab963006320ae" providerId="Windows Live" clId="Web-{4D041D26-129F-4DA4-AB9B-E21DC7DBE14F}" dt="2019-11-21T09:47:53.287" v="0"/>
-        <pc:sldMasterMkLst>
-          <pc:docMk/>
-          <pc:sldMasterMk cId="4061580742" sldId="2147483763"/>
-        </pc:sldMasterMkLst>
-        <pc:sldLayoutChg chg="add">
-          <pc:chgData name="Rithie Natan" userId="515ab963006320ae" providerId="Windows Live" clId="Web-{4D041D26-129F-4DA4-AB9B-E21DC7DBE14F}" dt="2019-11-21T09:47:53.287" v="0"/>
-          <pc:sldLayoutMkLst>
-            <pc:docMk/>
-            <pc:sldMasterMk cId="4061580742" sldId="2147483763"/>
-            <pc:sldLayoutMk cId="2374364772" sldId="2147483752"/>
-          </pc:sldLayoutMkLst>
-        </pc:sldLayoutChg>
-        <pc:sldLayoutChg chg="add">
-          <pc:chgData name="Rithie Natan" userId="515ab963006320ae" providerId="Windows Live" clId="Web-{4D041D26-129F-4DA4-AB9B-E21DC7DBE14F}" dt="2019-11-21T09:47:53.287" v="0"/>
-          <pc:sldLayoutMkLst>
-            <pc:docMk/>
-            <pc:sldMasterMk cId="4061580742" sldId="2147483763"/>
-            <pc:sldLayoutMk cId="1871514767" sldId="2147483753"/>
-          </pc:sldLayoutMkLst>
-        </pc:sldLayoutChg>
-        <pc:sldLayoutChg chg="add">
-          <pc:chgData name="Rithie Natan" userId="515ab963006320ae" providerId="Windows Live" clId="Web-{4D041D26-129F-4DA4-AB9B-E21DC7DBE14F}" dt="2019-11-21T09:47:53.287" v="0"/>
-          <pc:sldLayoutMkLst>
-            <pc:docMk/>
-            <pc:sldMasterMk cId="4061580742" sldId="2147483763"/>
-            <pc:sldLayoutMk cId="3395493350" sldId="2147483754"/>
-          </pc:sldLayoutMkLst>
-        </pc:sldLayoutChg>
-        <pc:sldLayoutChg chg="add">
-          <pc:chgData name="Rithie Natan" userId="515ab963006320ae" providerId="Windows Live" clId="Web-{4D041D26-129F-4DA4-AB9B-E21DC7DBE14F}" dt="2019-11-21T09:47:53.287" v="0"/>
-          <pc:sldLayoutMkLst>
-            <pc:docMk/>
-            <pc:sldMasterMk cId="4061580742" sldId="2147483763"/>
-            <pc:sldLayoutMk cId="2613957397" sldId="2147483755"/>
-          </pc:sldLayoutMkLst>
-        </pc:sldLayoutChg>
-        <pc:sldLayoutChg chg="add">
-          <pc:chgData name="Rithie Natan" userId="515ab963006320ae" providerId="Windows Live" clId="Web-{4D041D26-129F-4DA4-AB9B-E21DC7DBE14F}" dt="2019-11-21T09:47:53.287" v="0"/>
-          <pc:sldLayoutMkLst>
-            <pc:docMk/>
-            <pc:sldMasterMk cId="4061580742" sldId="2147483763"/>
-            <pc:sldLayoutMk cId="3351502020" sldId="2147483756"/>
-          </pc:sldLayoutMkLst>
-        </pc:sldLayoutChg>
-        <pc:sldLayoutChg chg="add">
-          <pc:chgData name="Rithie Natan" userId="515ab963006320ae" providerId="Windows Live" clId="Web-{4D041D26-129F-4DA4-AB9B-E21DC7DBE14F}" dt="2019-11-21T09:47:53.287" v="0"/>
-          <pc:sldLayoutMkLst>
-            <pc:docMk/>
-            <pc:sldMasterMk cId="4061580742" sldId="2147483763"/>
-            <pc:sldLayoutMk cId="1142575261" sldId="2147483757"/>
-          </pc:sldLayoutMkLst>
-        </pc:sldLayoutChg>
-        <pc:sldLayoutChg chg="add">
-          <pc:chgData name="Rithie Natan" userId="515ab963006320ae" providerId="Windows Live" clId="Web-{4D041D26-129F-4DA4-AB9B-E21DC7DBE14F}" dt="2019-11-21T09:47:53.287" v="0"/>
-          <pc:sldLayoutMkLst>
-            <pc:docMk/>
-            <pc:sldMasterMk cId="4061580742" sldId="2147483763"/>
-            <pc:sldLayoutMk cId="3138633691" sldId="2147483758"/>
-          </pc:sldLayoutMkLst>
-        </pc:sldLayoutChg>
-        <pc:sldLayoutChg chg="add">
-          <pc:chgData name="Rithie Natan" userId="515ab963006320ae" providerId="Windows Live" clId="Web-{4D041D26-129F-4DA4-AB9B-E21DC7DBE14F}" dt="2019-11-21T09:47:53.287" v="0"/>
-          <pc:sldLayoutMkLst>
-            <pc:docMk/>
-            <pc:sldMasterMk cId="4061580742" sldId="2147483763"/>
-            <pc:sldLayoutMk cId="721112423" sldId="2147483759"/>
-          </pc:sldLayoutMkLst>
-        </pc:sldLayoutChg>
-        <pc:sldLayoutChg chg="add">
-          <pc:chgData name="Rithie Natan" userId="515ab963006320ae" providerId="Windows Live" clId="Web-{4D041D26-129F-4DA4-AB9B-E21DC7DBE14F}" dt="2019-11-21T09:47:53.287" v="0"/>
-          <pc:sldLayoutMkLst>
-            <pc:docMk/>
-            <pc:sldMasterMk cId="4061580742" sldId="2147483763"/>
-            <pc:sldLayoutMk cId="180996363" sldId="2147483760"/>
-          </pc:sldLayoutMkLst>
-        </pc:sldLayoutChg>
-        <pc:sldLayoutChg chg="add">
-          <pc:chgData name="Rithie Natan" userId="515ab963006320ae" providerId="Windows Live" clId="Web-{4D041D26-129F-4DA4-AB9B-E21DC7DBE14F}" dt="2019-11-21T09:47:53.287" v="0"/>
-          <pc:sldLayoutMkLst>
-            <pc:docMk/>
-            <pc:sldMasterMk cId="4061580742" sldId="2147483763"/>
-            <pc:sldLayoutMk cId="1127928967" sldId="2147483761"/>
-          </pc:sldLayoutMkLst>
-        </pc:sldLayoutChg>
-        <pc:sldLayoutChg chg="add">
-          <pc:chgData name="Rithie Natan" userId="515ab963006320ae" providerId="Windows Live" clId="Web-{4D041D26-129F-4DA4-AB9B-E21DC7DBE14F}" dt="2019-11-21T09:47:53.287" v="0"/>
-          <pc:sldLayoutMkLst>
-            <pc:docMk/>
-            <pc:sldMasterMk cId="4061580742" sldId="2147483763"/>
-            <pc:sldLayoutMk cId="3534142434" sldId="2147483762"/>
-          </pc:sldLayoutMkLst>
-        </pc:sldLayoutChg>
-      </pc:sldMasterChg>
-    </pc:docChg>
-  </pc:docChgLst>
-</pc:chgInfo>
 </file>
 
 <file path=ppt/slideLayouts/slideLayout1.xml><?xml version="1.0" encoding="utf-8"?>

</xml_diff>